<commit_message>
tambahan pengelompokan packages :D
</commit_message>
<xml_diff>
--- a/BATMAN’S CHALLENGE(presentasi).pptx
+++ b/BATMAN’S CHALLENGE(presentasi).pptx
@@ -6,8 +6,8 @@
   </p:sldMasterIdLst>
   <p:sldIdLst>
     <p:sldId id="256" r:id="rId2"/>
-    <p:sldId id="257" r:id="rId3"/>
-    <p:sldId id="258" r:id="rId4"/>
+    <p:sldId id="258" r:id="rId3"/>
+    <p:sldId id="261" r:id="rId4"/>
     <p:sldId id="259" r:id="rId5"/>
     <p:sldId id="260" r:id="rId6"/>
   </p:sldIdLst>
@@ -292,7 +292,8 @@
           <a:p>
             <a:fld id="{858F6CBF-6B4A-4006-ADA7-EA0EC448C16F}" type="datetimeFigureOut">
               <a:rPr lang="en-US" smtClean="0"/>
-              <a:t>11/9/2014</a:t>
+              <a:pPr/>
+              <a:t>11/16/2014</a:t>
             </a:fld>
             <a:endParaRPr lang="en-US"/>
           </a:p>
@@ -334,6 +335,7 @@
           <a:p>
             <a:fld id="{9F08030B-BE44-44EA-BE7E-40BA2EAECA21}" type="slidenum">
               <a:rPr lang="en-US" smtClean="0"/>
+              <a:pPr/>
               <a:t>‹#›</a:t>
             </a:fld>
             <a:endParaRPr lang="en-US"/>
@@ -457,7 +459,8 @@
           <a:p>
             <a:fld id="{858F6CBF-6B4A-4006-ADA7-EA0EC448C16F}" type="datetimeFigureOut">
               <a:rPr lang="en-US" smtClean="0"/>
-              <a:t>11/9/2014</a:t>
+              <a:pPr/>
+              <a:t>11/16/2014</a:t>
             </a:fld>
             <a:endParaRPr lang="en-US"/>
           </a:p>
@@ -499,6 +502,7 @@
           <a:p>
             <a:fld id="{9F08030B-BE44-44EA-BE7E-40BA2EAECA21}" type="slidenum">
               <a:rPr lang="en-US" smtClean="0"/>
+              <a:pPr/>
               <a:t>‹#›</a:t>
             </a:fld>
             <a:endParaRPr lang="en-US"/>
@@ -632,7 +636,8 @@
           <a:p>
             <a:fld id="{858F6CBF-6B4A-4006-ADA7-EA0EC448C16F}" type="datetimeFigureOut">
               <a:rPr lang="en-US" smtClean="0"/>
-              <a:t>11/9/2014</a:t>
+              <a:pPr/>
+              <a:t>11/16/2014</a:t>
             </a:fld>
             <a:endParaRPr lang="en-US"/>
           </a:p>
@@ -674,6 +679,7 @@
           <a:p>
             <a:fld id="{9F08030B-BE44-44EA-BE7E-40BA2EAECA21}" type="slidenum">
               <a:rPr lang="en-US" smtClean="0"/>
+              <a:pPr/>
               <a:t>‹#›</a:t>
             </a:fld>
             <a:endParaRPr lang="en-US"/>
@@ -797,7 +803,8 @@
           <a:p>
             <a:fld id="{858F6CBF-6B4A-4006-ADA7-EA0EC448C16F}" type="datetimeFigureOut">
               <a:rPr lang="en-US" smtClean="0"/>
-              <a:t>11/9/2014</a:t>
+              <a:pPr/>
+              <a:t>11/16/2014</a:t>
             </a:fld>
             <a:endParaRPr lang="en-US"/>
           </a:p>
@@ -839,6 +846,7 @@
           <a:p>
             <a:fld id="{9F08030B-BE44-44EA-BE7E-40BA2EAECA21}" type="slidenum">
               <a:rPr lang="en-US" smtClean="0"/>
+              <a:pPr/>
               <a:t>‹#›</a:t>
             </a:fld>
             <a:endParaRPr lang="en-US"/>
@@ -1038,7 +1046,8 @@
           <a:p>
             <a:fld id="{858F6CBF-6B4A-4006-ADA7-EA0EC448C16F}" type="datetimeFigureOut">
               <a:rPr lang="en-US" smtClean="0"/>
-              <a:t>11/9/2014</a:t>
+              <a:pPr/>
+              <a:t>11/16/2014</a:t>
             </a:fld>
             <a:endParaRPr lang="en-US"/>
           </a:p>
@@ -1080,6 +1089,7 @@
           <a:p>
             <a:fld id="{9F08030B-BE44-44EA-BE7E-40BA2EAECA21}" type="slidenum">
               <a:rPr lang="en-US" smtClean="0"/>
+              <a:pPr/>
               <a:t>‹#›</a:t>
             </a:fld>
             <a:endParaRPr lang="en-US"/>
@@ -1321,7 +1331,8 @@
           <a:p>
             <a:fld id="{858F6CBF-6B4A-4006-ADA7-EA0EC448C16F}" type="datetimeFigureOut">
               <a:rPr lang="en-US" smtClean="0"/>
-              <a:t>11/9/2014</a:t>
+              <a:pPr/>
+              <a:t>11/16/2014</a:t>
             </a:fld>
             <a:endParaRPr lang="en-US"/>
           </a:p>
@@ -1363,6 +1374,7 @@
           <a:p>
             <a:fld id="{9F08030B-BE44-44EA-BE7E-40BA2EAECA21}" type="slidenum">
               <a:rPr lang="en-US" smtClean="0"/>
+              <a:pPr/>
               <a:t>‹#›</a:t>
             </a:fld>
             <a:endParaRPr lang="en-US"/>
@@ -1738,7 +1750,8 @@
           <a:p>
             <a:fld id="{858F6CBF-6B4A-4006-ADA7-EA0EC448C16F}" type="datetimeFigureOut">
               <a:rPr lang="en-US" smtClean="0"/>
-              <a:t>11/9/2014</a:t>
+              <a:pPr/>
+              <a:t>11/16/2014</a:t>
             </a:fld>
             <a:endParaRPr lang="en-US"/>
           </a:p>
@@ -1780,6 +1793,7 @@
           <a:p>
             <a:fld id="{9F08030B-BE44-44EA-BE7E-40BA2EAECA21}" type="slidenum">
               <a:rPr lang="en-US" smtClean="0"/>
+              <a:pPr/>
               <a:t>‹#›</a:t>
             </a:fld>
             <a:endParaRPr lang="en-US"/>
@@ -1851,7 +1865,8 @@
           <a:p>
             <a:fld id="{858F6CBF-6B4A-4006-ADA7-EA0EC448C16F}" type="datetimeFigureOut">
               <a:rPr lang="en-US" smtClean="0"/>
-              <a:t>11/9/2014</a:t>
+              <a:pPr/>
+              <a:t>11/16/2014</a:t>
             </a:fld>
             <a:endParaRPr lang="en-US"/>
           </a:p>
@@ -1893,6 +1908,7 @@
           <a:p>
             <a:fld id="{9F08030B-BE44-44EA-BE7E-40BA2EAECA21}" type="slidenum">
               <a:rPr lang="en-US" smtClean="0"/>
+              <a:pPr/>
               <a:t>‹#›</a:t>
             </a:fld>
             <a:endParaRPr lang="en-US"/>
@@ -1941,7 +1957,8 @@
           <a:p>
             <a:fld id="{858F6CBF-6B4A-4006-ADA7-EA0EC448C16F}" type="datetimeFigureOut">
               <a:rPr lang="en-US" smtClean="0"/>
-              <a:t>11/9/2014</a:t>
+              <a:pPr/>
+              <a:t>11/16/2014</a:t>
             </a:fld>
             <a:endParaRPr lang="en-US"/>
           </a:p>
@@ -1983,6 +2000,7 @@
           <a:p>
             <a:fld id="{9F08030B-BE44-44EA-BE7E-40BA2EAECA21}" type="slidenum">
               <a:rPr lang="en-US" smtClean="0"/>
+              <a:pPr/>
               <a:t>‹#›</a:t>
             </a:fld>
             <a:endParaRPr lang="en-US"/>
@@ -2213,7 +2231,8 @@
           <a:p>
             <a:fld id="{858F6CBF-6B4A-4006-ADA7-EA0EC448C16F}" type="datetimeFigureOut">
               <a:rPr lang="en-US" smtClean="0"/>
-              <a:t>11/9/2014</a:t>
+              <a:pPr/>
+              <a:t>11/16/2014</a:t>
             </a:fld>
             <a:endParaRPr lang="en-US"/>
           </a:p>
@@ -2255,6 +2274,7 @@
           <a:p>
             <a:fld id="{9F08030B-BE44-44EA-BE7E-40BA2EAECA21}" type="slidenum">
               <a:rPr lang="en-US" smtClean="0"/>
+              <a:pPr/>
               <a:t>‹#›</a:t>
             </a:fld>
             <a:endParaRPr lang="en-US"/>
@@ -2461,7 +2481,8 @@
           <a:p>
             <a:fld id="{858F6CBF-6B4A-4006-ADA7-EA0EC448C16F}" type="datetimeFigureOut">
               <a:rPr lang="en-US" smtClean="0"/>
-              <a:t>11/9/2014</a:t>
+              <a:pPr/>
+              <a:t>11/16/2014</a:t>
             </a:fld>
             <a:endParaRPr lang="en-US"/>
           </a:p>
@@ -2503,6 +2524,7 @@
           <a:p>
             <a:fld id="{9F08030B-BE44-44EA-BE7E-40BA2EAECA21}" type="slidenum">
               <a:rPr lang="en-US" smtClean="0"/>
+              <a:pPr/>
               <a:t>‹#›</a:t>
             </a:fld>
             <a:endParaRPr lang="en-US"/>
@@ -2669,7 +2691,8 @@
           <a:p>
             <a:fld id="{858F6CBF-6B4A-4006-ADA7-EA0EC448C16F}" type="datetimeFigureOut">
               <a:rPr lang="en-US" smtClean="0"/>
-              <a:t>11/9/2014</a:t>
+              <a:pPr/>
+              <a:t>11/16/2014</a:t>
             </a:fld>
             <a:endParaRPr lang="en-US"/>
           </a:p>
@@ -2747,6 +2770,7 @@
           <a:p>
             <a:fld id="{9F08030B-BE44-44EA-BE7E-40BA2EAECA21}" type="slidenum">
               <a:rPr lang="en-US" smtClean="0"/>
+              <a:pPr/>
               <a:t>‹#›</a:t>
             </a:fld>
             <a:endParaRPr lang="en-US"/>
@@ -3055,10 +3079,18 @@
           <a:lstStyle/>
           <a:p>
             <a:r>
-              <a:rPr lang="en-US" dirty="0" smtClean="0"/>
+              <a:rPr lang="en-US" b="1" dirty="0" smtClean="0">
+                <a:solidFill>
+                  <a:schemeClr val="accent1"/>
+                </a:solidFill>
+              </a:rPr>
               <a:t>BATMAN’S CHALLENGE</a:t>
             </a:r>
-            <a:endParaRPr lang="en-US" dirty="0"/>
+            <a:endParaRPr lang="en-US" b="1" dirty="0">
+              <a:solidFill>
+                <a:schemeClr val="accent1"/>
+              </a:solidFill>
+            </a:endParaRPr>
           </a:p>
         </p:txBody>
       </p:sp>
@@ -3205,45 +3237,79 @@
             <p:ph type="title"/>
           </p:nvPr>
         </p:nvSpPr>
-        <p:spPr/>
+        <p:spPr>
+          <a:xfrm>
+            <a:off x="457200" y="274638"/>
+            <a:ext cx="8077200" cy="868362"/>
+          </a:xfrm>
+        </p:spPr>
         <p:txBody>
           <a:bodyPr>
-            <a:noAutofit/>
+            <a:normAutofit fontScale="90000"/>
           </a:bodyPr>
           <a:lstStyle/>
           <a:p>
             <a:r>
-              <a:rPr lang="en-US" sz="3600" dirty="0" err="1" smtClean="0"/>
-              <a:t>Deskripsi</a:t>
-            </a:r>
-            <a:r>
-              <a:rPr lang="en-US" sz="3600" dirty="0" smtClean="0"/>
+              <a:rPr lang="en-US" dirty="0" err="1" smtClean="0">
+                <a:solidFill>
+                  <a:schemeClr val="accent1"/>
+                </a:solidFill>
+              </a:rPr>
+              <a:t>Objek-objek</a:t>
+            </a:r>
+            <a:r>
+              <a:rPr lang="en-US" dirty="0">
+                <a:solidFill>
+                  <a:schemeClr val="accent1"/>
+                </a:solidFill>
+              </a:rPr>
               <a:t> </a:t>
             </a:r>
-            <a:br>
-              <a:rPr lang="en-US" sz="3600" dirty="0" smtClean="0"/>
-            </a:br>
-            <a:r>
-              <a:rPr lang="en-US" sz="3600" dirty="0" err="1" smtClean="0"/>
-              <a:t>desain</a:t>
-            </a:r>
-            <a:r>
-              <a:rPr lang="en-US" sz="3600" dirty="0" smtClean="0"/>
+            <a:r>
+              <a:rPr lang="en-US" dirty="0" smtClean="0">
+                <a:solidFill>
+                  <a:schemeClr val="accent1"/>
+                </a:solidFill>
+              </a:rPr>
+              <a:t>yang </a:t>
+            </a:r>
+            <a:r>
+              <a:rPr lang="en-US" dirty="0" err="1" smtClean="0">
+                <a:solidFill>
+                  <a:schemeClr val="accent1"/>
+                </a:solidFill>
+              </a:rPr>
+              <a:t>terdapat</a:t>
+            </a:r>
+            <a:r>
+              <a:rPr lang="en-US" dirty="0" smtClean="0">
+                <a:solidFill>
+                  <a:schemeClr val="accent1"/>
+                </a:solidFill>
+              </a:rPr>
               <a:t> </a:t>
             </a:r>
             <a:r>
-              <a:rPr lang="en-US" sz="3600" dirty="0" err="1" smtClean="0"/>
-              <a:t>aplikasi</a:t>
-            </a:r>
-            <a:r>
-              <a:rPr lang="en-US" sz="3600" dirty="0" smtClean="0"/>
-              <a:t> yang </a:t>
-            </a:r>
-            <a:r>
-              <a:rPr lang="en-US" sz="3600" dirty="0" err="1" smtClean="0"/>
-              <a:t>dibuat</a:t>
-            </a:r>
-            <a:endParaRPr lang="en-US" sz="3600" dirty="0"/>
+              <a:rPr lang="en-US" dirty="0" err="1" smtClean="0">
+                <a:solidFill>
+                  <a:schemeClr val="accent1"/>
+                </a:solidFill>
+              </a:rPr>
+              <a:t>pada</a:t>
+            </a:r>
+            <a:r>
+              <a:rPr lang="en-US" dirty="0" smtClean="0">
+                <a:solidFill>
+                  <a:schemeClr val="accent1"/>
+                </a:solidFill>
+              </a:rPr>
+              <a:t> Batman’s Challenge</a:t>
+            </a:r>
+            <a:endParaRPr lang="en-US" dirty="0">
+              <a:solidFill>
+                <a:schemeClr val="accent1"/>
+              </a:solidFill>
+            </a:endParaRPr>
           </a:p>
         </p:txBody>
       </p:sp>
@@ -3257,15 +3323,277 @@
             <p:ph idx="1"/>
           </p:nvPr>
         </p:nvSpPr>
-        <p:spPr/>
-        <p:txBody>
-          <a:bodyPr/>
-          <a:lstStyle/>
-          <a:p>
+        <p:spPr>
+          <a:xfrm>
+            <a:off x="457200" y="1600200"/>
+            <a:ext cx="8229600" cy="5029200"/>
+          </a:xfrm>
+        </p:spPr>
+        <p:txBody>
+          <a:bodyPr>
+            <a:normAutofit/>
+          </a:bodyPr>
+          <a:lstStyle/>
+          <a:p>
+            <a:pPr>
+              <a:buNone/>
+            </a:pPr>
+            <a:r>
+              <a:rPr lang="en-US" sz="4000" dirty="0" smtClean="0"/>
+              <a:t>Batman			</a:t>
+            </a:r>
+            <a:r>
+              <a:rPr lang="en-US" sz="4000" dirty="0" smtClean="0"/>
+              <a:t>        Floor</a:t>
+            </a:r>
+            <a:endParaRPr lang="en-US" sz="4000" dirty="0" smtClean="0"/>
+          </a:p>
+          <a:p>
+            <a:pPr>
+              <a:buNone/>
+            </a:pPr>
+            <a:endParaRPr lang="en-US" sz="4000" dirty="0" smtClean="0"/>
+          </a:p>
+          <a:p>
+            <a:pPr>
+              <a:buNone/>
+            </a:pPr>
+            <a:r>
+              <a:rPr lang="en-US" sz="4000" dirty="0" err="1" smtClean="0"/>
+              <a:t>Nightwing</a:t>
+            </a:r>
+            <a:r>
+              <a:rPr lang="en-US" sz="4000" dirty="0" smtClean="0"/>
+              <a:t>		</a:t>
+            </a:r>
+            <a:r>
+              <a:rPr lang="en-US" sz="4000" dirty="0" smtClean="0"/>
+              <a:t>        Wall</a:t>
+            </a:r>
+            <a:endParaRPr lang="en-US" sz="4000" dirty="0" smtClean="0"/>
+          </a:p>
+          <a:p>
+            <a:pPr>
+              <a:buNone/>
+            </a:pPr>
+            <a:endParaRPr lang="en-US" dirty="0" smtClean="0"/>
+          </a:p>
+          <a:p>
+            <a:pPr>
+              <a:buNone/>
+            </a:pPr>
+            <a:r>
+              <a:rPr lang="en-US" sz="4300" dirty="0" smtClean="0"/>
+              <a:t>Batgirl</a:t>
+            </a:r>
+            <a:r>
+              <a:rPr lang="en-US" sz="4300" dirty="0" smtClean="0"/>
+              <a:t>			</a:t>
+            </a:r>
+            <a:r>
+              <a:rPr lang="en-US" sz="4300" dirty="0" smtClean="0"/>
+              <a:t>       IC</a:t>
+            </a:r>
+            <a:endParaRPr lang="en-US" sz="4300" dirty="0" smtClean="0"/>
+          </a:p>
+          <a:p>
+            <a:pPr>
+              <a:buNone/>
+            </a:pPr>
+            <a:endParaRPr lang="en-US" sz="4000" dirty="0" smtClean="0"/>
+          </a:p>
+          <a:p>
+            <a:pPr>
+              <a:buNone/>
+            </a:pPr>
+            <a:r>
+              <a:rPr lang="en-US" sz="4000" dirty="0" smtClean="0"/>
+              <a:t>Red Robin</a:t>
+            </a:r>
+            <a:endParaRPr lang="en-US" sz="4000" dirty="0" smtClean="0"/>
+          </a:p>
+          <a:p>
+            <a:pPr>
+              <a:buNone/>
+            </a:pPr>
             <a:endParaRPr lang="en-US" dirty="0"/>
           </a:p>
         </p:txBody>
       </p:sp>
+      <p:pic>
+        <p:nvPicPr>
+          <p:cNvPr id="6" name="Picture 5" descr="batman.png"/>
+          <p:cNvPicPr>
+            <a:picLocks noChangeAspect="1"/>
+          </p:cNvPicPr>
+          <p:nvPr/>
+        </p:nvPicPr>
+        <p:blipFill>
+          <a:blip r:embed="rId2" cstate="print"/>
+          <a:stretch>
+            <a:fillRect/>
+          </a:stretch>
+        </p:blipFill>
+        <p:spPr>
+          <a:xfrm>
+            <a:off x="3200400" y="1524000"/>
+            <a:ext cx="762000" cy="1143000"/>
+          </a:xfrm>
+          <a:prstGeom prst="rect">
+            <a:avLst/>
+          </a:prstGeom>
+        </p:spPr>
+      </p:pic>
+      <p:pic>
+        <p:nvPicPr>
+          <p:cNvPr id="7" name="Picture 6" descr="Floor.png"/>
+          <p:cNvPicPr>
+            <a:picLocks noChangeAspect="1"/>
+          </p:cNvPicPr>
+          <p:nvPr/>
+        </p:nvPicPr>
+        <p:blipFill>
+          <a:blip r:embed="rId3" cstate="print"/>
+          <a:stretch>
+            <a:fillRect/>
+          </a:stretch>
+        </p:blipFill>
+        <p:spPr>
+          <a:xfrm>
+            <a:off x="7010400" y="1447800"/>
+            <a:ext cx="914400" cy="914400"/>
+          </a:xfrm>
+          <a:prstGeom prst="rect">
+            <a:avLst/>
+          </a:prstGeom>
+        </p:spPr>
+      </p:pic>
+      <p:pic>
+        <p:nvPicPr>
+          <p:cNvPr id="9" name="Picture 8" descr="Wall.jpg"/>
+          <p:cNvPicPr>
+            <a:picLocks noChangeAspect="1"/>
+          </p:cNvPicPr>
+          <p:nvPr/>
+        </p:nvPicPr>
+        <p:blipFill>
+          <a:blip r:embed="rId4" cstate="print"/>
+          <a:stretch>
+            <a:fillRect/>
+          </a:stretch>
+        </p:blipFill>
+        <p:spPr>
+          <a:xfrm>
+            <a:off x="7010400" y="2895600"/>
+            <a:ext cx="914400" cy="914400"/>
+          </a:xfrm>
+          <a:prstGeom prst="rect">
+            <a:avLst/>
+          </a:prstGeom>
+        </p:spPr>
+      </p:pic>
+      <p:pic>
+        <p:nvPicPr>
+          <p:cNvPr id="10" name="Picture 9" descr="IC.jpg"/>
+          <p:cNvPicPr>
+            <a:picLocks noChangeAspect="1"/>
+          </p:cNvPicPr>
+          <p:nvPr/>
+        </p:nvPicPr>
+        <p:blipFill>
+          <a:blip r:embed="rId5" cstate="print"/>
+          <a:stretch>
+            <a:fillRect/>
+          </a:stretch>
+        </p:blipFill>
+        <p:spPr>
+          <a:xfrm>
+            <a:off x="7010400" y="4191000"/>
+            <a:ext cx="990600" cy="990600"/>
+          </a:xfrm>
+          <a:prstGeom prst="rect">
+            <a:avLst/>
+          </a:prstGeom>
+        </p:spPr>
+      </p:pic>
+      <p:pic>
+        <p:nvPicPr>
+          <p:cNvPr id="2051" name="Picture 3" descr="D:\KULIAH\SEM 9\ADBO\TA\Chips-challenge\Chip\Image\Batgirl.png"/>
+          <p:cNvPicPr>
+            <a:picLocks noChangeAspect="1" noChangeArrowheads="1"/>
+          </p:cNvPicPr>
+          <p:nvPr/>
+        </p:nvPicPr>
+        <p:blipFill>
+          <a:blip r:embed="rId6" cstate="print"/>
+          <a:srcRect/>
+          <a:stretch>
+            <a:fillRect/>
+          </a:stretch>
+        </p:blipFill>
+        <p:spPr bwMode="auto">
+          <a:xfrm>
+            <a:off x="3276600" y="4191000"/>
+            <a:ext cx="685800" cy="1097280"/>
+          </a:xfrm>
+          <a:prstGeom prst="rect">
+            <a:avLst/>
+          </a:prstGeom>
+          <a:noFill/>
+        </p:spPr>
+      </p:pic>
+      <p:pic>
+        <p:nvPicPr>
+          <p:cNvPr id="2052" name="Picture 4" descr="D:\KULIAH\SEM 9\ADBO\TA\Chips-challenge\Chip\Image\NightWing.png"/>
+          <p:cNvPicPr>
+            <a:picLocks noChangeAspect="1" noChangeArrowheads="1"/>
+          </p:cNvPicPr>
+          <p:nvPr/>
+        </p:nvPicPr>
+        <p:blipFill>
+          <a:blip r:embed="rId7" cstate="print"/>
+          <a:srcRect/>
+          <a:stretch>
+            <a:fillRect/>
+          </a:stretch>
+        </p:blipFill>
+        <p:spPr bwMode="auto">
+          <a:xfrm>
+            <a:off x="3200400" y="2743200"/>
+            <a:ext cx="838200" cy="1286550"/>
+          </a:xfrm>
+          <a:prstGeom prst="rect">
+            <a:avLst/>
+          </a:prstGeom>
+          <a:noFill/>
+        </p:spPr>
+      </p:pic>
+      <p:pic>
+        <p:nvPicPr>
+          <p:cNvPr id="2053" name="Picture 5" descr="D:\KULIAH\SEM 9\ADBO\TA\Chips-challenge\Chip\Image\RedRobin.png"/>
+          <p:cNvPicPr>
+            <a:picLocks noChangeAspect="1" noChangeArrowheads="1"/>
+          </p:cNvPicPr>
+          <p:nvPr/>
+        </p:nvPicPr>
+        <p:blipFill>
+          <a:blip r:embed="rId8" cstate="print"/>
+          <a:srcRect/>
+          <a:stretch>
+            <a:fillRect/>
+          </a:stretch>
+        </p:blipFill>
+        <p:spPr bwMode="auto">
+          <a:xfrm>
+            <a:off x="3200400" y="5562600"/>
+            <a:ext cx="843967" cy="1295400"/>
+          </a:xfrm>
+          <a:prstGeom prst="rect">
+            <a:avLst/>
+          </a:prstGeom>
+          <a:noFill/>
+        </p:spPr>
+      </p:pic>
     </p:spTree>
   </p:cSld>
   <p:clrMapOvr>
@@ -3309,80 +3637,137 @@
           <a:lstStyle/>
           <a:p>
             <a:r>
-              <a:rPr lang="en-US" dirty="0" err="1" smtClean="0"/>
+              <a:rPr lang="en-US" dirty="0" err="1" smtClean="0">
+                <a:solidFill>
+                  <a:schemeClr val="accent1"/>
+                </a:solidFill>
+              </a:rPr>
               <a:t>Objek-objek</a:t>
             </a:r>
             <a:r>
-              <a:rPr lang="en-US" dirty="0"/>
+              <a:rPr lang="en-US" dirty="0" smtClean="0">
+                <a:solidFill>
+                  <a:schemeClr val="accent1"/>
+                </a:solidFill>
+              </a:rPr>
+              <a:t> yang </a:t>
+            </a:r>
+            <a:r>
+              <a:rPr lang="en-US" dirty="0" err="1" smtClean="0">
+                <a:solidFill>
+                  <a:schemeClr val="accent1"/>
+                </a:solidFill>
+              </a:rPr>
+              <a:t>terdapat</a:t>
+            </a:r>
+            <a:r>
+              <a:rPr lang="en-US" dirty="0" smtClean="0">
+                <a:solidFill>
+                  <a:schemeClr val="accent1"/>
+                </a:solidFill>
+              </a:rPr>
               <a:t> </a:t>
             </a:r>
             <a:r>
+              <a:rPr lang="en-US" dirty="0" err="1" smtClean="0">
+                <a:solidFill>
+                  <a:schemeClr val="accent1"/>
+                </a:solidFill>
+              </a:rPr>
+              <a:t>pada</a:t>
+            </a:r>
+            <a:r>
+              <a:rPr lang="en-US" dirty="0" smtClean="0">
+                <a:solidFill>
+                  <a:schemeClr val="accent1"/>
+                </a:solidFill>
+              </a:rPr>
+              <a:t> Batman’s </a:t>
+            </a:r>
+            <a:r>
+              <a:rPr lang="en-US" dirty="0" smtClean="0">
+                <a:solidFill>
+                  <a:schemeClr val="accent1"/>
+                </a:solidFill>
+              </a:rPr>
+              <a:t>Challenge</a:t>
+            </a:r>
+            <a:endParaRPr lang="en-US" dirty="0"/>
+          </a:p>
+        </p:txBody>
+      </p:sp>
+      <p:sp>
+        <p:nvSpPr>
+          <p:cNvPr id="5" name="Content Placeholder 4"/>
+          <p:cNvSpPr>
+            <a:spLocks noGrp="1"/>
+          </p:cNvSpPr>
+          <p:nvPr>
+            <p:ph sz="half" idx="2"/>
+          </p:nvPr>
+        </p:nvSpPr>
+        <p:spPr/>
+        <p:txBody>
+          <a:bodyPr/>
+          <a:lstStyle/>
+          <a:p>
+            <a:r>
               <a:rPr lang="en-US" dirty="0" smtClean="0"/>
-              <a:t>yang </a:t>
-            </a:r>
-            <a:r>
-              <a:rPr lang="en-US" dirty="0" err="1" smtClean="0"/>
-              <a:t>terdapat</a:t>
+              <a:t>Blue </a:t>
             </a:r>
             <a:r>
               <a:rPr lang="en-US" dirty="0" smtClean="0"/>
-              <a:t> </a:t>
-            </a:r>
-            <a:r>
-              <a:rPr lang="en-US" dirty="0" err="1" smtClean="0"/>
-              <a:t>pada</a:t>
-            </a:r>
+              <a:t>Shoes</a:t>
+            </a:r>
+          </a:p>
+          <a:p>
+            <a:endParaRPr lang="en-US" dirty="0" smtClean="0"/>
+          </a:p>
+          <a:p>
+            <a:endParaRPr lang="en-US" dirty="0" smtClean="0"/>
+          </a:p>
+          <a:p>
             <a:r>
               <a:rPr lang="en-US" dirty="0" smtClean="0"/>
-              <a:t> Batman’s Challenge</a:t>
-            </a:r>
+              <a:t>Barrier </a:t>
+            </a:r>
+          </a:p>
+          <a:p>
+            <a:endParaRPr lang="en-US" dirty="0" smtClean="0"/>
+          </a:p>
+          <a:p>
+            <a:endParaRPr lang="en-US" dirty="0" smtClean="0"/>
+          </a:p>
+          <a:p>
+            <a:r>
+              <a:rPr lang="en-US" dirty="0" smtClean="0"/>
+              <a:t>Finish  </a:t>
+            </a:r>
+            <a:endParaRPr lang="en-US" dirty="0" smtClean="0"/>
+          </a:p>
+          <a:p>
             <a:endParaRPr lang="en-US" dirty="0"/>
           </a:p>
         </p:txBody>
       </p:sp>
       <p:sp>
         <p:nvSpPr>
-          <p:cNvPr id="3" name="Content Placeholder 2"/>
-          <p:cNvSpPr>
-            <a:spLocks noGrp="1"/>
-          </p:cNvSpPr>
-          <p:nvPr>
-            <p:ph idx="1"/>
-          </p:nvPr>
-        </p:nvSpPr>
-        <p:spPr>
-          <a:xfrm>
-            <a:off x="457200" y="1600200"/>
-            <a:ext cx="8229600" cy="5029200"/>
-          </a:xfrm>
-        </p:spPr>
-        <p:txBody>
-          <a:bodyPr>
-            <a:normAutofit/>
-          </a:bodyPr>
-          <a:lstStyle/>
-          <a:p>
-            <a:pPr>
-              <a:buNone/>
-            </a:pPr>
-            <a:r>
-              <a:rPr lang="en-US" sz="4000" dirty="0" smtClean="0"/>
-              <a:t>Batman			Floor</a:t>
-            </a:r>
-          </a:p>
-          <a:p>
-            <a:pPr>
-              <a:buNone/>
-            </a:pPr>
-            <a:endParaRPr lang="en-US" sz="4000" dirty="0" smtClean="0"/>
-          </a:p>
-          <a:p>
-            <a:pPr>
-              <a:buNone/>
-            </a:pPr>
-            <a:r>
-              <a:rPr lang="en-US" sz="4000" dirty="0" smtClean="0"/>
-              <a:t>Fire				Wall</a:t>
+          <p:cNvPr id="8" name="Content Placeholder 7"/>
+          <p:cNvSpPr>
+            <a:spLocks noGrp="1"/>
+          </p:cNvSpPr>
+          <p:nvPr>
+            <p:ph sz="half" idx="1"/>
+          </p:nvPr>
+        </p:nvSpPr>
+        <p:spPr/>
+        <p:txBody>
+          <a:bodyPr/>
+          <a:lstStyle/>
+          <a:p>
+            <a:r>
+              <a:rPr lang="en-US" dirty="0" smtClean="0"/>
+              <a:t>Fire</a:t>
             </a:r>
           </a:p>
           <a:p>
@@ -3395,99 +3780,48 @@
             <a:pPr>
               <a:buNone/>
             </a:pPr>
-            <a:r>
-              <a:rPr lang="en-US" sz="4300" dirty="0" smtClean="0"/>
-              <a:t>IC				Barrier </a:t>
+            <a:endParaRPr lang="en-US" dirty="0" smtClean="0"/>
+          </a:p>
+          <a:p>
+            <a:r>
+              <a:rPr lang="en-US" dirty="0" smtClean="0"/>
+              <a:t>Water </a:t>
             </a:r>
           </a:p>
           <a:p>
             <a:pPr>
               <a:buNone/>
             </a:pPr>
-            <a:endParaRPr lang="en-US" sz="4000" dirty="0" smtClean="0"/>
-          </a:p>
-          <a:p>
-            <a:pPr>
-              <a:buNone/>
-            </a:pPr>
-            <a:r>
-              <a:rPr lang="en-US" sz="4000" dirty="0" smtClean="0"/>
-              <a:t>Finish</a:t>
-            </a:r>
-          </a:p>
-          <a:p>
-            <a:pPr>
-              <a:buNone/>
-            </a:pPr>
-            <a:endParaRPr lang="en-US" dirty="0"/>
+            <a:endParaRPr lang="en-US" dirty="0" smtClean="0"/>
+          </a:p>
+          <a:p>
+            <a:endParaRPr lang="en-US" dirty="0" smtClean="0"/>
+          </a:p>
+          <a:p>
+            <a:r>
+              <a:rPr lang="en-US" dirty="0" smtClean="0"/>
+              <a:t>Red Shoes</a:t>
+            </a:r>
           </a:p>
         </p:txBody>
       </p:sp>
       <p:pic>
         <p:nvPicPr>
-          <p:cNvPr id="6" name="Picture 5" descr="batman.png"/>
+          <p:cNvPr id="9" name="Content Placeholder 3" descr="Fire.jpg"/>
           <p:cNvPicPr>
             <a:picLocks noChangeAspect="1"/>
           </p:cNvPicPr>
           <p:nvPr/>
         </p:nvPicPr>
         <p:blipFill>
-          <a:blip r:embed="rId2"/>
+          <a:blip r:embed="rId2" cstate="print"/>
           <a:stretch>
             <a:fillRect/>
           </a:stretch>
         </p:blipFill>
         <p:spPr>
           <a:xfrm>
-            <a:off x="2209800" y="1371600"/>
-            <a:ext cx="990600" cy="1485900"/>
-          </a:xfrm>
-          <a:prstGeom prst="rect">
-            <a:avLst/>
-          </a:prstGeom>
-        </p:spPr>
-      </p:pic>
-      <p:pic>
-        <p:nvPicPr>
-          <p:cNvPr id="7" name="Picture 6" descr="Floor.png"/>
-          <p:cNvPicPr>
-            <a:picLocks noChangeAspect="1"/>
-          </p:cNvPicPr>
-          <p:nvPr/>
-        </p:nvPicPr>
-        <p:blipFill>
-          <a:blip r:embed="rId3"/>
-          <a:stretch>
-            <a:fillRect/>
-          </a:stretch>
-        </p:blipFill>
-        <p:spPr>
-          <a:xfrm>
-            <a:off x="5791200" y="1600200"/>
-            <a:ext cx="914400" cy="914400"/>
-          </a:xfrm>
-          <a:prstGeom prst="rect">
-            <a:avLst/>
-          </a:prstGeom>
-        </p:spPr>
-      </p:pic>
-      <p:pic>
-        <p:nvPicPr>
-          <p:cNvPr id="8" name="Picture 7" descr="Fire.jpg"/>
-          <p:cNvPicPr>
-            <a:picLocks noChangeAspect="1"/>
-          </p:cNvPicPr>
-          <p:nvPr/>
-        </p:nvPicPr>
-        <p:blipFill>
-          <a:blip r:embed="rId4"/>
-          <a:stretch>
-            <a:fillRect/>
-          </a:stretch>
-        </p:blipFill>
-        <p:spPr>
-          <a:xfrm>
-            <a:off x="2209800" y="2971800"/>
+            <a:off x="2743200" y="1600200"/>
             <a:ext cx="990600" cy="990600"/>
           </a:xfrm>
           <a:prstGeom prst="rect">
@@ -3497,22 +3831,100 @@
       </p:pic>
       <p:pic>
         <p:nvPicPr>
-          <p:cNvPr id="9" name="Picture 8" descr="Wall.jpg"/>
+          <p:cNvPr id="1026" name="Picture 2" descr="D:\KULIAH\SEM 9\ADBO\TA\Chips-challenge\Chip\Image\Water.gif"/>
+          <p:cNvPicPr>
+            <a:picLocks noChangeAspect="1" noChangeArrowheads="1" noCrop="1"/>
+          </p:cNvPicPr>
+          <p:nvPr/>
+        </p:nvPicPr>
+        <p:blipFill>
+          <a:blip r:embed="rId3" cstate="print"/>
+          <a:srcRect/>
+          <a:stretch>
+            <a:fillRect/>
+          </a:stretch>
+        </p:blipFill>
+        <p:spPr bwMode="auto">
+          <a:xfrm>
+            <a:off x="2667000" y="3048000"/>
+            <a:ext cx="990600" cy="990600"/>
+          </a:xfrm>
+          <a:prstGeom prst="rect">
+            <a:avLst/>
+          </a:prstGeom>
+          <a:noFill/>
+        </p:spPr>
+      </p:pic>
+      <p:pic>
+        <p:nvPicPr>
+          <p:cNvPr id="1027" name="Picture 3" descr="D:\KULIAH\SEM 9\ADBO\TA\Chips-challenge\Chip\Image\RedShoes.jpg"/>
+          <p:cNvPicPr>
+            <a:picLocks noChangeAspect="1" noChangeArrowheads="1"/>
+          </p:cNvPicPr>
+          <p:nvPr/>
+        </p:nvPicPr>
+        <p:blipFill>
+          <a:blip r:embed="rId4" cstate="print"/>
+          <a:srcRect/>
+          <a:stretch>
+            <a:fillRect/>
+          </a:stretch>
+        </p:blipFill>
+        <p:spPr bwMode="auto">
+          <a:xfrm>
+            <a:off x="2667000" y="4572000"/>
+            <a:ext cx="990600" cy="990600"/>
+          </a:xfrm>
+          <a:prstGeom prst="rect">
+            <a:avLst/>
+          </a:prstGeom>
+          <a:noFill/>
+        </p:spPr>
+      </p:pic>
+      <p:pic>
+        <p:nvPicPr>
+          <p:cNvPr id="1028" name="Picture 4" descr="D:\KULIAH\SEM 9\ADBO\TA\Chips-challenge\Chip\Image\BlueShoes.jpg"/>
+          <p:cNvPicPr>
+            <a:picLocks noChangeAspect="1" noChangeArrowheads="1"/>
+          </p:cNvPicPr>
+          <p:nvPr/>
+        </p:nvPicPr>
+        <p:blipFill>
+          <a:blip r:embed="rId5" cstate="print"/>
+          <a:srcRect/>
+          <a:stretch>
+            <a:fillRect/>
+          </a:stretch>
+        </p:blipFill>
+        <p:spPr bwMode="auto">
+          <a:xfrm>
+            <a:off x="7391400" y="1447800"/>
+            <a:ext cx="990600" cy="990600"/>
+          </a:xfrm>
+          <a:prstGeom prst="rect">
+            <a:avLst/>
+          </a:prstGeom>
+          <a:noFill/>
+        </p:spPr>
+      </p:pic>
+      <p:pic>
+        <p:nvPicPr>
+          <p:cNvPr id="13" name="Picture 12" descr="Barrier.png"/>
           <p:cNvPicPr>
             <a:picLocks noChangeAspect="1"/>
           </p:cNvPicPr>
           <p:nvPr/>
         </p:nvPicPr>
         <p:blipFill>
-          <a:blip r:embed="rId5"/>
+          <a:blip r:embed="rId6" cstate="print"/>
           <a:stretch>
             <a:fillRect/>
           </a:stretch>
         </p:blipFill>
         <p:spPr>
           <a:xfrm>
-            <a:off x="5791200" y="2895600"/>
-            <a:ext cx="914400" cy="914400"/>
+            <a:off x="7391400" y="2971800"/>
+            <a:ext cx="1001731" cy="990600"/>
           </a:xfrm>
           <a:prstGeom prst="rect">
             <a:avLst/>
@@ -3521,69 +3933,21 @@
       </p:pic>
       <p:pic>
         <p:nvPicPr>
-          <p:cNvPr id="10" name="Picture 9" descr="IC.jpg"/>
+          <p:cNvPr id="14" name="Picture 13" descr="Portal.jpg"/>
           <p:cNvPicPr>
             <a:picLocks noChangeAspect="1"/>
           </p:cNvPicPr>
           <p:nvPr/>
         </p:nvPicPr>
         <p:blipFill>
-          <a:blip r:embed="rId6"/>
+          <a:blip r:embed="rId7" cstate="print"/>
           <a:stretch>
             <a:fillRect/>
           </a:stretch>
         </p:blipFill>
         <p:spPr>
           <a:xfrm>
-            <a:off x="2209800" y="4267200"/>
-            <a:ext cx="990600" cy="990600"/>
-          </a:xfrm>
-          <a:prstGeom prst="rect">
-            <a:avLst/>
-          </a:prstGeom>
-        </p:spPr>
-      </p:pic>
-      <p:pic>
-        <p:nvPicPr>
-          <p:cNvPr id="11" name="Picture 10" descr="Barrier.png"/>
-          <p:cNvPicPr>
-            <a:picLocks noChangeAspect="1"/>
-          </p:cNvPicPr>
-          <p:nvPr/>
-        </p:nvPicPr>
-        <p:blipFill>
-          <a:blip r:embed="rId7"/>
-          <a:stretch>
-            <a:fillRect/>
-          </a:stretch>
-        </p:blipFill>
-        <p:spPr>
-          <a:xfrm>
-            <a:off x="5791200" y="4343399"/>
-            <a:ext cx="924676" cy="914401"/>
-          </a:xfrm>
-          <a:prstGeom prst="rect">
-            <a:avLst/>
-          </a:prstGeom>
-        </p:spPr>
-      </p:pic>
-      <p:pic>
-        <p:nvPicPr>
-          <p:cNvPr id="12" name="Picture 11" descr="Portal.jpg"/>
-          <p:cNvPicPr>
-            <a:picLocks noChangeAspect="1"/>
-          </p:cNvPicPr>
-          <p:nvPr/>
-        </p:nvPicPr>
-        <p:blipFill>
-          <a:blip r:embed="rId8"/>
-          <a:stretch>
-            <a:fillRect/>
-          </a:stretch>
-        </p:blipFill>
-        <p:spPr>
-          <a:xfrm>
-            <a:off x="2209800" y="5562600"/>
+            <a:off x="7391400" y="4495800"/>
             <a:ext cx="1066800" cy="1066800"/>
           </a:xfrm>
           <a:prstGeom prst="rect">
@@ -3653,29 +4017,25 @@
           </a:p>
         </p:txBody>
       </p:sp>
-      <p:pic>
-        <p:nvPicPr>
-          <p:cNvPr id="4" name="Content Placeholder 3" descr="Class Diagram 9 November.png"/>
-          <p:cNvPicPr>
-            <a:picLocks noGrp="1" noChangeAspect="1"/>
-          </p:cNvPicPr>
+      <p:sp>
+        <p:nvSpPr>
+          <p:cNvPr id="5" name="Content Placeholder 4"/>
+          <p:cNvSpPr>
+            <a:spLocks noGrp="1"/>
+          </p:cNvSpPr>
           <p:nvPr>
             <p:ph idx="1"/>
           </p:nvPr>
-        </p:nvPicPr>
-        <p:blipFill>
-          <a:blip r:embed="rId2"/>
-          <a:stretch>
-            <a:fillRect/>
-          </a:stretch>
-        </p:blipFill>
-        <p:spPr>
-          <a:xfrm>
-            <a:off x="2667000" y="228600"/>
-            <a:ext cx="6369205" cy="6324600"/>
-          </a:xfrm>
-        </p:spPr>
-      </p:pic>
+        </p:nvSpPr>
+        <p:spPr/>
+        <p:txBody>
+          <a:bodyPr/>
+          <a:lstStyle/>
+          <a:p>
+            <a:endParaRPr lang="en-US"/>
+          </a:p>
+        </p:txBody>
+      </p:sp>
     </p:spTree>
   </p:cSld>
   <p:clrMapOvr>

</xml_diff>

<commit_message>
Selamat siang teman-teman :D aku barusan bikin class diagramnya yaa
</commit_message>
<xml_diff>
--- a/BATMAN’S CHALLENGE(presentasi).pptx
+++ b/BATMAN’S CHALLENGE(presentasi).pptx
@@ -293,7 +293,7 @@
             <a:fld id="{858F6CBF-6B4A-4006-ADA7-EA0EC448C16F}" type="datetimeFigureOut">
               <a:rPr lang="en-US" smtClean="0"/>
               <a:pPr/>
-              <a:t>11/16/2014</a:t>
+              <a:t>11/20/2014</a:t>
             </a:fld>
             <a:endParaRPr lang="en-US"/>
           </a:p>
@@ -460,7 +460,7 @@
             <a:fld id="{858F6CBF-6B4A-4006-ADA7-EA0EC448C16F}" type="datetimeFigureOut">
               <a:rPr lang="en-US" smtClean="0"/>
               <a:pPr/>
-              <a:t>11/16/2014</a:t>
+              <a:t>11/20/2014</a:t>
             </a:fld>
             <a:endParaRPr lang="en-US"/>
           </a:p>
@@ -637,7 +637,7 @@
             <a:fld id="{858F6CBF-6B4A-4006-ADA7-EA0EC448C16F}" type="datetimeFigureOut">
               <a:rPr lang="en-US" smtClean="0"/>
               <a:pPr/>
-              <a:t>11/16/2014</a:t>
+              <a:t>11/20/2014</a:t>
             </a:fld>
             <a:endParaRPr lang="en-US"/>
           </a:p>
@@ -804,7 +804,7 @@
             <a:fld id="{858F6CBF-6B4A-4006-ADA7-EA0EC448C16F}" type="datetimeFigureOut">
               <a:rPr lang="en-US" smtClean="0"/>
               <a:pPr/>
-              <a:t>11/16/2014</a:t>
+              <a:t>11/20/2014</a:t>
             </a:fld>
             <a:endParaRPr lang="en-US"/>
           </a:p>
@@ -1047,7 +1047,7 @@
             <a:fld id="{858F6CBF-6B4A-4006-ADA7-EA0EC448C16F}" type="datetimeFigureOut">
               <a:rPr lang="en-US" smtClean="0"/>
               <a:pPr/>
-              <a:t>11/16/2014</a:t>
+              <a:t>11/20/2014</a:t>
             </a:fld>
             <a:endParaRPr lang="en-US"/>
           </a:p>
@@ -1332,7 +1332,7 @@
             <a:fld id="{858F6CBF-6B4A-4006-ADA7-EA0EC448C16F}" type="datetimeFigureOut">
               <a:rPr lang="en-US" smtClean="0"/>
               <a:pPr/>
-              <a:t>11/16/2014</a:t>
+              <a:t>11/20/2014</a:t>
             </a:fld>
             <a:endParaRPr lang="en-US"/>
           </a:p>
@@ -1751,7 +1751,7 @@
             <a:fld id="{858F6CBF-6B4A-4006-ADA7-EA0EC448C16F}" type="datetimeFigureOut">
               <a:rPr lang="en-US" smtClean="0"/>
               <a:pPr/>
-              <a:t>11/16/2014</a:t>
+              <a:t>11/20/2014</a:t>
             </a:fld>
             <a:endParaRPr lang="en-US"/>
           </a:p>
@@ -1866,7 +1866,7 @@
             <a:fld id="{858F6CBF-6B4A-4006-ADA7-EA0EC448C16F}" type="datetimeFigureOut">
               <a:rPr lang="en-US" smtClean="0"/>
               <a:pPr/>
-              <a:t>11/16/2014</a:t>
+              <a:t>11/20/2014</a:t>
             </a:fld>
             <a:endParaRPr lang="en-US"/>
           </a:p>
@@ -1958,7 +1958,7 @@
             <a:fld id="{858F6CBF-6B4A-4006-ADA7-EA0EC448C16F}" type="datetimeFigureOut">
               <a:rPr lang="en-US" smtClean="0"/>
               <a:pPr/>
-              <a:t>11/16/2014</a:t>
+              <a:t>11/20/2014</a:t>
             </a:fld>
             <a:endParaRPr lang="en-US"/>
           </a:p>
@@ -2232,7 +2232,7 @@
             <a:fld id="{858F6CBF-6B4A-4006-ADA7-EA0EC448C16F}" type="datetimeFigureOut">
               <a:rPr lang="en-US" smtClean="0"/>
               <a:pPr/>
-              <a:t>11/16/2014</a:t>
+              <a:t>11/20/2014</a:t>
             </a:fld>
             <a:endParaRPr lang="en-US"/>
           </a:p>
@@ -2482,7 +2482,7 @@
             <a:fld id="{858F6CBF-6B4A-4006-ADA7-EA0EC448C16F}" type="datetimeFigureOut">
               <a:rPr lang="en-US" smtClean="0"/>
               <a:pPr/>
-              <a:t>11/16/2014</a:t>
+              <a:t>11/20/2014</a:t>
             </a:fld>
             <a:endParaRPr lang="en-US"/>
           </a:p>
@@ -2692,7 +2692,7 @@
             <a:fld id="{858F6CBF-6B4A-4006-ADA7-EA0EC448C16F}" type="datetimeFigureOut">
               <a:rPr lang="en-US" smtClean="0"/>
               <a:pPr/>
-              <a:t>11/16/2014</a:t>
+              <a:t>11/20/2014</a:t>
             </a:fld>
             <a:endParaRPr lang="en-US"/>
           </a:p>
@@ -3340,13 +3340,8 @@
             </a:pPr>
             <a:r>
               <a:rPr lang="en-US" sz="4000" dirty="0" smtClean="0"/>
-              <a:t>Batman			</a:t>
-            </a:r>
-            <a:r>
-              <a:rPr lang="en-US" sz="4000" dirty="0" smtClean="0"/>
-              <a:t>        Floor</a:t>
-            </a:r>
-            <a:endParaRPr lang="en-US" sz="4000" dirty="0" smtClean="0"/>
+              <a:t>Batman			        Floor</a:t>
+            </a:r>
           </a:p>
           <a:p>
             <a:pPr>
@@ -3364,13 +3359,8 @@
             </a:r>
             <a:r>
               <a:rPr lang="en-US" sz="4000" dirty="0" smtClean="0"/>
-              <a:t>		</a:t>
-            </a:r>
-            <a:r>
-              <a:rPr lang="en-US" sz="4000" dirty="0" smtClean="0"/>
-              <a:t>        Wall</a:t>
-            </a:r>
-            <a:endParaRPr lang="en-US" sz="4000" dirty="0" smtClean="0"/>
+              <a:t>		        Wall</a:t>
+            </a:r>
           </a:p>
           <a:p>
             <a:pPr>
@@ -3384,17 +3374,8 @@
             </a:pPr>
             <a:r>
               <a:rPr lang="en-US" sz="4300" dirty="0" smtClean="0"/>
-              <a:t>Batgirl</a:t>
-            </a:r>
-            <a:r>
-              <a:rPr lang="en-US" sz="4300" dirty="0" smtClean="0"/>
-              <a:t>			</a:t>
-            </a:r>
-            <a:r>
-              <a:rPr lang="en-US" sz="4300" dirty="0" smtClean="0"/>
-              <a:t>       IC</a:t>
-            </a:r>
-            <a:endParaRPr lang="en-US" sz="4300" dirty="0" smtClean="0"/>
+              <a:t>Batgirl			       IC</a:t>
+            </a:r>
           </a:p>
           <a:p>
             <a:pPr>
@@ -3410,7 +3391,6 @@
               <a:rPr lang="en-US" sz="4000" dirty="0" smtClean="0"/>
               <a:t>Red Robin</a:t>
             </a:r>
-            <a:endParaRPr lang="en-US" sz="4000" dirty="0" smtClean="0"/>
           </a:p>
           <a:p>
             <a:pPr>
@@ -3599,6 +3579,13 @@
   <p:clrMapOvr>
     <a:masterClrMapping/>
   </p:clrMapOvr>
+  <p:timing>
+    <p:tnLst>
+      <p:par>
+        <p:cTn id="1" dur="indefinite" restart="never" nodeType="tmRoot"/>
+      </p:par>
+    </p:tnLst>
+  </p:timing>
 </p:sld>
 </file>
 
@@ -3682,15 +3669,7 @@
                   <a:schemeClr val="accent1"/>
                 </a:solidFill>
               </a:rPr>
-              <a:t> Batman’s </a:t>
-            </a:r>
-            <a:r>
-              <a:rPr lang="en-US" dirty="0" smtClean="0">
-                <a:solidFill>
-                  <a:schemeClr val="accent1"/>
-                </a:solidFill>
-              </a:rPr>
-              <a:t>Challenge</a:t>
+              <a:t> Batman’s Challenge</a:t>
             </a:r>
             <a:endParaRPr lang="en-US" dirty="0"/>
           </a:p>
@@ -3713,11 +3692,7 @@
           <a:p>
             <a:r>
               <a:rPr lang="en-US" dirty="0" smtClean="0"/>
-              <a:t>Blue </a:t>
-            </a:r>
-            <a:r>
-              <a:rPr lang="en-US" dirty="0" smtClean="0"/>
-              <a:t>Shoes</a:t>
+              <a:t>Blue Shoes</a:t>
             </a:r>
           </a:p>
           <a:p>
@@ -3743,7 +3718,6 @@
               <a:rPr lang="en-US" dirty="0" smtClean="0"/>
               <a:t>Finish  </a:t>
             </a:r>
-            <a:endParaRPr lang="en-US" dirty="0" smtClean="0"/>
           </a:p>
           <a:p>
             <a:endParaRPr lang="en-US" dirty="0"/>
@@ -3960,6 +3934,13 @@
   <p:clrMapOvr>
     <a:masterClrMapping/>
   </p:clrMapOvr>
+  <p:timing>
+    <p:tnLst>
+      <p:par>
+        <p:cTn id="1" dur="indefinite" restart="never" nodeType="tmRoot"/>
+      </p:par>
+    </p:tnLst>
+  </p:timing>
 </p:sld>
 </file>
 
@@ -3980,62 +3961,29 @@
           <a:chExt cx="0" cy="0"/>
         </a:xfrm>
       </p:grpSpPr>
-      <p:sp>
-        <p:nvSpPr>
-          <p:cNvPr id="2" name="Title 1"/>
-          <p:cNvSpPr>
-            <a:spLocks noGrp="1"/>
-          </p:cNvSpPr>
-          <p:nvPr>
-            <p:ph type="title"/>
-          </p:nvPr>
-        </p:nvSpPr>
+      <p:pic>
+        <p:nvPicPr>
+          <p:cNvPr id="4" name="Content Placeholder 3" descr="uml 20 november.jpg"/>
+          <p:cNvPicPr>
+            <a:picLocks noGrp="1" noChangeAspect="1"/>
+          </p:cNvPicPr>
+          <p:nvPr>
+            <p:ph idx="1"/>
+          </p:nvPr>
+        </p:nvPicPr>
+        <p:blipFill>
+          <a:blip r:embed="rId2"/>
+          <a:stretch>
+            <a:fillRect/>
+          </a:stretch>
+        </p:blipFill>
         <p:spPr>
           <a:xfrm>
-            <a:off x="228600" y="228600"/>
-            <a:ext cx="2667000" cy="6324600"/>
+            <a:off x="0" y="-1"/>
+            <a:ext cx="9144000" cy="7303111"/>
           </a:xfrm>
         </p:spPr>
-        <p:txBody>
-          <a:bodyPr>
-            <a:normAutofit/>
-          </a:bodyPr>
-          <a:lstStyle/>
-          <a:p>
-            <a:r>
-              <a:rPr lang="en-US" sz="3200" dirty="0" smtClean="0"/>
-              <a:t>Class Diagram </a:t>
-            </a:r>
-            <a:br>
-              <a:rPr lang="en-US" sz="3200" dirty="0" smtClean="0"/>
-            </a:br>
-            <a:r>
-              <a:rPr lang="en-US" sz="3200" dirty="0" smtClean="0"/>
-              <a:t>Batman’s Challenge</a:t>
-            </a:r>
-            <a:endParaRPr lang="en-US" sz="3200" dirty="0"/>
-          </a:p>
-        </p:txBody>
-      </p:sp>
-      <p:sp>
-        <p:nvSpPr>
-          <p:cNvPr id="5" name="Content Placeholder 4"/>
-          <p:cNvSpPr>
-            <a:spLocks noGrp="1"/>
-          </p:cNvSpPr>
-          <p:nvPr>
-            <p:ph idx="1"/>
-          </p:nvPr>
-        </p:nvSpPr>
-        <p:spPr/>
-        <p:txBody>
-          <a:bodyPr/>
-          <a:lstStyle/>
-          <a:p>
-            <a:endParaRPr lang="en-US"/>
-          </a:p>
-        </p:txBody>
-      </p:sp>
+      </p:pic>
     </p:spTree>
   </p:cSld>
   <p:clrMapOvr>
@@ -4142,6 +4090,13 @@
   <p:clrMapOvr>
     <a:masterClrMapping/>
   </p:clrMapOvr>
+  <p:timing>
+    <p:tnLst>
+      <p:par>
+        <p:cTn id="1" dur="indefinite" restart="never" nodeType="tmRoot"/>
+      </p:par>
+    </p:tnLst>
+  </p:timing>
 </p:sld>
 </file>
 

</xml_diff>

<commit_message>
Slide Presentasi Tugas Besar ADBO final
</commit_message>
<xml_diff>
--- a/BATMAN’S CHALLENGE(presentasi).pptx
+++ b/BATMAN’S CHALLENGE(presentasi).pptx
@@ -8,8 +8,12 @@
     <p:sldId id="256" r:id="rId2"/>
     <p:sldId id="258" r:id="rId3"/>
     <p:sldId id="261" r:id="rId4"/>
-    <p:sldId id="259" r:id="rId5"/>
-    <p:sldId id="260" r:id="rId6"/>
+    <p:sldId id="263" r:id="rId5"/>
+    <p:sldId id="262" r:id="rId6"/>
+    <p:sldId id="264" r:id="rId7"/>
+    <p:sldId id="265" r:id="rId8"/>
+    <p:sldId id="259" r:id="rId9"/>
+    <p:sldId id="260" r:id="rId10"/>
   </p:sldIdLst>
   <p:sldSz cx="9144000" cy="6858000" type="screen4x3"/>
   <p:notesSz cx="6858000" cy="9144000"/>
@@ -3105,18 +3109,14 @@
             <a:r>
               <a:rPr lang="en-US" b="1" dirty="0" smtClean="0">
                 <a:solidFill>
-                  <a:schemeClr val="tx2">
-                    <a:lumMod val="75000"/>
-                  </a:schemeClr>
+                  <a:srgbClr val="FF0000"/>
                 </a:solidFill>
               </a:rPr>
               <a:t>BATMAN’S CHALLENGE</a:t>
             </a:r>
             <a:endParaRPr lang="en-US" b="1" dirty="0">
               <a:solidFill>
-                <a:schemeClr val="tx2">
-                  <a:lumMod val="75000"/>
-                </a:schemeClr>
+                <a:srgbClr val="FF0000"/>
               </a:solidFill>
             </a:endParaRPr>
           </a:p>
@@ -3367,6 +3367,13 @@
   <p:clrMapOvr>
     <a:masterClrMapping/>
   </p:clrMapOvr>
+  <p:timing>
+    <p:tnLst>
+      <p:par>
+        <p:cTn id="1" dur="indefinite" restart="never" nodeType="tmRoot"/>
+      </p:par>
+    </p:tnLst>
+  </p:timing>
 </p:sld>
 </file>
 
@@ -3387,203 +3394,163 @@
           <a:chExt cx="0" cy="0"/>
         </a:xfrm>
       </p:grpSpPr>
-      <p:sp>
-        <p:nvSpPr>
-          <p:cNvPr id="2" name="Title 1"/>
-          <p:cNvSpPr>
-            <a:spLocks noGrp="1"/>
-          </p:cNvSpPr>
-          <p:nvPr>
-            <p:ph type="title"/>
-          </p:nvPr>
-        </p:nvSpPr>
-        <p:spPr>
-          <a:xfrm>
-            <a:off x="457200" y="274638"/>
-            <a:ext cx="8077200" cy="868362"/>
-          </a:xfrm>
-        </p:spPr>
-        <p:txBody>
-          <a:bodyPr>
-            <a:normAutofit fontScale="90000"/>
-          </a:bodyPr>
-          <a:lstStyle/>
-          <a:p>
-            <a:r>
-              <a:rPr lang="en-US" dirty="0" err="1" smtClean="0">
-                <a:solidFill>
-                  <a:schemeClr val="accent1"/>
-                </a:solidFill>
-              </a:rPr>
-              <a:t>Objek-objek</a:t>
-            </a:r>
-            <a:r>
-              <a:rPr lang="en-US" dirty="0">
-                <a:solidFill>
-                  <a:schemeClr val="accent1"/>
-                </a:solidFill>
-              </a:rPr>
-              <a:t> </a:t>
-            </a:r>
-            <a:r>
-              <a:rPr lang="en-US" dirty="0" smtClean="0">
-                <a:solidFill>
-                  <a:schemeClr val="accent1"/>
-                </a:solidFill>
-              </a:rPr>
-              <a:t>yang </a:t>
-            </a:r>
-            <a:r>
-              <a:rPr lang="en-US" dirty="0" err="1" smtClean="0">
-                <a:solidFill>
-                  <a:schemeClr val="accent1"/>
-                </a:solidFill>
-              </a:rPr>
-              <a:t>terdapat</a:t>
-            </a:r>
-            <a:r>
-              <a:rPr lang="en-US" dirty="0" smtClean="0">
-                <a:solidFill>
-                  <a:schemeClr val="accent1"/>
-                </a:solidFill>
-              </a:rPr>
-              <a:t> </a:t>
-            </a:r>
-            <a:r>
-              <a:rPr lang="en-US" dirty="0" err="1" smtClean="0">
-                <a:solidFill>
-                  <a:schemeClr val="accent1"/>
-                </a:solidFill>
-              </a:rPr>
-              <a:t>pada</a:t>
-            </a:r>
-            <a:r>
-              <a:rPr lang="en-US" dirty="0" smtClean="0">
-                <a:solidFill>
-                  <a:schemeClr val="accent1"/>
-                </a:solidFill>
-              </a:rPr>
-              <a:t> Batman’s Challenge</a:t>
-            </a:r>
-            <a:endParaRPr lang="en-US" dirty="0">
-              <a:solidFill>
-                <a:schemeClr val="accent1"/>
-              </a:solidFill>
-            </a:endParaRPr>
-          </a:p>
-        </p:txBody>
-      </p:sp>
-      <p:sp>
-        <p:nvSpPr>
-          <p:cNvPr id="3" name="Content Placeholder 2"/>
-          <p:cNvSpPr>
-            <a:spLocks noGrp="1"/>
-          </p:cNvSpPr>
-          <p:nvPr>
-            <p:ph idx="1"/>
-          </p:nvPr>
-        </p:nvSpPr>
-        <p:spPr>
-          <a:xfrm>
-            <a:off x="457200" y="1600200"/>
-            <a:ext cx="8229600" cy="5029200"/>
-          </a:xfrm>
-        </p:spPr>
-        <p:txBody>
-          <a:bodyPr>
-            <a:normAutofit/>
-          </a:bodyPr>
-          <a:lstStyle/>
-          <a:p>
-            <a:pPr>
-              <a:buNone/>
-            </a:pPr>
-            <a:r>
-              <a:rPr lang="en-US" sz="4000" dirty="0" smtClean="0"/>
-              <a:t>Batman			        Floor</a:t>
-            </a:r>
-          </a:p>
-          <a:p>
-            <a:pPr>
-              <a:buNone/>
-            </a:pPr>
-            <a:endParaRPr lang="en-US" sz="4000" dirty="0" smtClean="0"/>
-          </a:p>
-          <a:p>
-            <a:pPr>
-              <a:buNone/>
-            </a:pPr>
-            <a:r>
-              <a:rPr lang="en-US" sz="4000" dirty="0" err="1" smtClean="0"/>
-              <a:t>Nightwing</a:t>
-            </a:r>
-            <a:r>
-              <a:rPr lang="en-US" sz="4000" dirty="0" smtClean="0"/>
-              <a:t>		        Wall</a:t>
-            </a:r>
-          </a:p>
-          <a:p>
-            <a:pPr>
-              <a:buNone/>
-            </a:pPr>
-            <a:endParaRPr lang="en-US" dirty="0" smtClean="0"/>
-          </a:p>
-          <a:p>
-            <a:pPr>
-              <a:buNone/>
-            </a:pPr>
-            <a:r>
-              <a:rPr lang="en-US" sz="4300" dirty="0" smtClean="0"/>
-              <a:t>Batgirl			       IC</a:t>
-            </a:r>
-          </a:p>
-          <a:p>
-            <a:pPr>
-              <a:buNone/>
-            </a:pPr>
-            <a:endParaRPr lang="en-US" sz="4000" dirty="0" smtClean="0"/>
-          </a:p>
-          <a:p>
-            <a:pPr>
-              <a:buNone/>
-            </a:pPr>
-            <a:r>
-              <a:rPr lang="en-US" sz="4000" dirty="0" smtClean="0"/>
-              <a:t>Red Robin</a:t>
-            </a:r>
-          </a:p>
-          <a:p>
-            <a:pPr>
-              <a:buNone/>
-            </a:pPr>
-            <a:endParaRPr lang="en-US" dirty="0"/>
-          </a:p>
-        </p:txBody>
-      </p:sp>
       <p:pic>
         <p:nvPicPr>
-          <p:cNvPr id="6" name="Picture 5" descr="batman.png"/>
+          <p:cNvPr id="13" name="Picture 12" descr="Gotham.jpg"/>
           <p:cNvPicPr>
             <a:picLocks noChangeAspect="1"/>
           </p:cNvPicPr>
           <p:nvPr/>
         </p:nvPicPr>
         <p:blipFill>
-          <a:blip r:embed="rId2" cstate="print"/>
+          <a:blip r:embed="rId2"/>
           <a:stretch>
             <a:fillRect/>
           </a:stretch>
         </p:blipFill>
         <p:spPr>
           <a:xfrm>
-            <a:off x="3200400" y="1524000"/>
-            <a:ext cx="762000" cy="1143000"/>
+            <a:off x="0" y="0"/>
+            <a:ext cx="9144000" cy="6858000"/>
           </a:xfrm>
           <a:prstGeom prst="rect">
             <a:avLst/>
           </a:prstGeom>
         </p:spPr>
       </p:pic>
+      <p:sp>
+        <p:nvSpPr>
+          <p:cNvPr id="11" name="Rounded Rectangle 10"/>
+          <p:cNvSpPr/>
+          <p:nvPr/>
+        </p:nvSpPr>
+        <p:spPr>
+          <a:xfrm>
+            <a:off x="304800" y="152400"/>
+            <a:ext cx="8534400" cy="1143000"/>
+          </a:xfrm>
+          <a:prstGeom prst="roundRect">
+            <a:avLst/>
+          </a:prstGeom>
+          <a:solidFill>
+            <a:schemeClr val="tx1"/>
+          </a:solidFill>
+        </p:spPr>
+        <p:style>
+          <a:lnRef idx="2">
+            <a:schemeClr val="accent1">
+              <a:shade val="50000"/>
+            </a:schemeClr>
+          </a:lnRef>
+          <a:fillRef idx="1">
+            <a:schemeClr val="accent1"/>
+          </a:fillRef>
+          <a:effectRef idx="0">
+            <a:schemeClr val="accent1"/>
+          </a:effectRef>
+          <a:fontRef idx="minor">
+            <a:schemeClr val="lt1"/>
+          </a:fontRef>
+        </p:style>
+        <p:txBody>
+          <a:bodyPr rtlCol="0" anchor="ctr"/>
+          <a:lstStyle/>
+          <a:p>
+            <a:pPr algn="ctr"/>
+            <a:endParaRPr lang="en-US" dirty="0">
+              <a:solidFill>
+                <a:srgbClr val="FF0000"/>
+              </a:solidFill>
+            </a:endParaRPr>
+          </a:p>
+        </p:txBody>
+      </p:sp>
+      <p:sp>
+        <p:nvSpPr>
+          <p:cNvPr id="2" name="Title 1"/>
+          <p:cNvSpPr>
+            <a:spLocks noGrp="1"/>
+          </p:cNvSpPr>
+          <p:nvPr>
+            <p:ph type="title"/>
+          </p:nvPr>
+        </p:nvSpPr>
+        <p:spPr>
+          <a:xfrm>
+            <a:off x="457200" y="274638"/>
+            <a:ext cx="8077200" cy="868362"/>
+          </a:xfrm>
+        </p:spPr>
+        <p:txBody>
+          <a:bodyPr>
+            <a:noAutofit/>
+          </a:bodyPr>
+          <a:lstStyle/>
+          <a:p>
+            <a:r>
+              <a:rPr lang="en-US" sz="3000" dirty="0" err="1" smtClean="0">
+                <a:solidFill>
+                  <a:schemeClr val="bg1"/>
+                </a:solidFill>
+              </a:rPr>
+              <a:t>Objek-objek</a:t>
+            </a:r>
+            <a:r>
+              <a:rPr lang="en-US" sz="3000" dirty="0">
+                <a:solidFill>
+                  <a:schemeClr val="bg1"/>
+                </a:solidFill>
+              </a:rPr>
+              <a:t> </a:t>
+            </a:r>
+            <a:r>
+              <a:rPr lang="en-US" sz="3000" dirty="0" smtClean="0">
+                <a:solidFill>
+                  <a:schemeClr val="bg1"/>
+                </a:solidFill>
+              </a:rPr>
+              <a:t>yang </a:t>
+            </a:r>
+            <a:r>
+              <a:rPr lang="en-US" sz="3000" dirty="0" err="1" smtClean="0">
+                <a:solidFill>
+                  <a:schemeClr val="bg1"/>
+                </a:solidFill>
+              </a:rPr>
+              <a:t>terdapat</a:t>
+            </a:r>
+            <a:r>
+              <a:rPr lang="en-US" sz="3000" dirty="0" smtClean="0">
+                <a:solidFill>
+                  <a:schemeClr val="bg1"/>
+                </a:solidFill>
+              </a:rPr>
+              <a:t> </a:t>
+            </a:r>
+            <a:r>
+              <a:rPr lang="en-US" sz="3000" dirty="0" err="1" smtClean="0">
+                <a:solidFill>
+                  <a:schemeClr val="bg1"/>
+                </a:solidFill>
+              </a:rPr>
+              <a:t>pada</a:t>
+            </a:r>
+            <a:r>
+              <a:rPr lang="en-US" sz="3000" dirty="0" smtClean="0">
+                <a:solidFill>
+                  <a:schemeClr val="bg1"/>
+                </a:solidFill>
+              </a:rPr>
+              <a:t> Batman’s Challenge</a:t>
+            </a:r>
+            <a:endParaRPr lang="en-US" sz="3000" dirty="0">
+              <a:solidFill>
+                <a:schemeClr val="bg1"/>
+              </a:solidFill>
+            </a:endParaRPr>
+          </a:p>
+        </p:txBody>
+      </p:sp>
       <p:pic>
         <p:nvPicPr>
           <p:cNvPr id="7" name="Picture 6" descr="Floor.png"/>
@@ -3600,7 +3567,7 @@
         </p:blipFill>
         <p:spPr>
           <a:xfrm>
-            <a:off x="7010400" y="1447800"/>
+            <a:off x="7543800" y="1447800"/>
             <a:ext cx="914400" cy="914400"/>
           </a:xfrm>
           <a:prstGeom prst="rect">
@@ -3624,7 +3591,7 @@
         </p:blipFill>
         <p:spPr>
           <a:xfrm>
-            <a:off x="7010400" y="2895600"/>
+            <a:off x="7543800" y="2895600"/>
             <a:ext cx="914400" cy="914400"/>
           </a:xfrm>
           <a:prstGeom prst="rect">
@@ -3648,7 +3615,7 @@
         </p:blipFill>
         <p:spPr>
           <a:xfrm>
-            <a:off x="7010400" y="4191000"/>
+            <a:off x="7467600" y="4114800"/>
             <a:ext cx="990600" cy="990600"/>
           </a:xfrm>
           <a:prstGeom prst="rect">
@@ -3658,7 +3625,7 @@
       </p:pic>
       <p:pic>
         <p:nvPicPr>
-          <p:cNvPr id="2051" name="Picture 3" descr="D:\KULIAH\SEM 9\ADBO\TA\Chips-challenge\Chip\Image\Batgirl.png"/>
+          <p:cNvPr id="1028" name="Picture 4" descr="D:\TA ADBO CHIP\Icon\batman copy.png"/>
           <p:cNvPicPr>
             <a:picLocks noChangeAspect="1" noChangeArrowheads="1"/>
           </p:cNvPicPr>
@@ -3673,8 +3640,8 @@
         </p:blipFill>
         <p:spPr bwMode="auto">
           <a:xfrm>
-            <a:off x="3276600" y="4191000"/>
-            <a:ext cx="685800" cy="1097280"/>
+            <a:off x="3276600" y="1600200"/>
+            <a:ext cx="668042" cy="1047750"/>
           </a:xfrm>
           <a:prstGeom prst="rect">
             <a:avLst/>
@@ -3684,7 +3651,7 @@
       </p:pic>
       <p:pic>
         <p:nvPicPr>
-          <p:cNvPr id="2052" name="Picture 4" descr="D:\KULIAH\SEM 9\ADBO\TA\Chips-challenge\Chip\Image\NightWing.png"/>
+          <p:cNvPr id="1029" name="Picture 5" descr="D:\TA ADBO CHIP\Icon\NightWing copy.png"/>
           <p:cNvPicPr>
             <a:picLocks noChangeAspect="1" noChangeArrowheads="1"/>
           </p:cNvPicPr>
@@ -3699,8 +3666,8 @@
         </p:blipFill>
         <p:spPr bwMode="auto">
           <a:xfrm>
-            <a:off x="3200400" y="2743200"/>
-            <a:ext cx="838200" cy="1286550"/>
+            <a:off x="3200400" y="2819400"/>
+            <a:ext cx="823919" cy="1292225"/>
           </a:xfrm>
           <a:prstGeom prst="rect">
             <a:avLst/>
@@ -3710,7 +3677,7 @@
       </p:pic>
       <p:pic>
         <p:nvPicPr>
-          <p:cNvPr id="2053" name="Picture 5" descr="D:\KULIAH\SEM 9\ADBO\TA\Chips-challenge\Chip\Image\RedRobin.png"/>
+          <p:cNvPr id="1030" name="Picture 6" descr="D:\TA ADBO CHIP\Icon\Batgirl.png"/>
           <p:cNvPicPr>
             <a:picLocks noChangeAspect="1" noChangeArrowheads="1"/>
           </p:cNvPicPr>
@@ -3725,8 +3692,8 @@
         </p:blipFill>
         <p:spPr bwMode="auto">
           <a:xfrm>
-            <a:off x="3200400" y="5562600"/>
-            <a:ext cx="843967" cy="1295400"/>
+            <a:off x="3352800" y="4314825"/>
+            <a:ext cx="697523" cy="1133474"/>
           </a:xfrm>
           <a:prstGeom prst="rect">
             <a:avLst/>
@@ -3734,6 +3701,562 @@
           <a:noFill/>
         </p:spPr>
       </p:pic>
+      <p:sp>
+        <p:nvSpPr>
+          <p:cNvPr id="23" name="Rounded Rectangle 22"/>
+          <p:cNvSpPr/>
+          <p:nvPr/>
+        </p:nvSpPr>
+        <p:spPr>
+          <a:xfrm>
+            <a:off x="457200" y="1676400"/>
+            <a:ext cx="2743200" cy="609600"/>
+          </a:xfrm>
+          <a:prstGeom prst="roundRect">
+            <a:avLst/>
+          </a:prstGeom>
+          <a:solidFill>
+            <a:schemeClr val="tx1"/>
+          </a:solidFill>
+        </p:spPr>
+        <p:style>
+          <a:lnRef idx="2">
+            <a:schemeClr val="accent1">
+              <a:shade val="50000"/>
+            </a:schemeClr>
+          </a:lnRef>
+          <a:fillRef idx="1">
+            <a:schemeClr val="accent1"/>
+          </a:fillRef>
+          <a:effectRef idx="0">
+            <a:schemeClr val="accent1"/>
+          </a:effectRef>
+          <a:fontRef idx="minor">
+            <a:schemeClr val="lt1"/>
+          </a:fontRef>
+        </p:style>
+        <p:txBody>
+          <a:bodyPr rtlCol="0" anchor="ctr"/>
+          <a:lstStyle/>
+          <a:p>
+            <a:pPr algn="ctr"/>
+            <a:endParaRPr lang="en-US"/>
+          </a:p>
+        </p:txBody>
+      </p:sp>
+      <p:pic>
+        <p:nvPicPr>
+          <p:cNvPr id="1031" name="Picture 7" descr="D:\TA ADBO CHIP\Icon\RedRobin copy.png"/>
+          <p:cNvPicPr>
+            <a:picLocks noChangeAspect="1" noChangeArrowheads="1"/>
+          </p:cNvPicPr>
+          <p:nvPr/>
+        </p:nvPicPr>
+        <p:blipFill>
+          <a:blip r:embed="rId9" cstate="print"/>
+          <a:srcRect/>
+          <a:stretch>
+            <a:fillRect/>
+          </a:stretch>
+        </p:blipFill>
+        <p:spPr bwMode="auto">
+          <a:xfrm>
+            <a:off x="3276600" y="5565775"/>
+            <a:ext cx="823919" cy="1292225"/>
+          </a:xfrm>
+          <a:prstGeom prst="rect">
+            <a:avLst/>
+          </a:prstGeom>
+          <a:noFill/>
+        </p:spPr>
+      </p:pic>
+      <p:pic>
+        <p:nvPicPr>
+          <p:cNvPr id="1032" name="Picture 8" descr="D:\TA ADBO CHIP\Icon\Joker.png"/>
+          <p:cNvPicPr>
+            <a:picLocks noChangeAspect="1" noChangeArrowheads="1"/>
+          </p:cNvPicPr>
+          <p:nvPr/>
+        </p:nvPicPr>
+        <p:blipFill>
+          <a:blip r:embed="rId10" cstate="print"/>
+          <a:srcRect/>
+          <a:stretch>
+            <a:fillRect/>
+          </a:stretch>
+        </p:blipFill>
+        <p:spPr bwMode="auto">
+          <a:xfrm>
+            <a:off x="7696200" y="5522203"/>
+            <a:ext cx="784225" cy="1335797"/>
+          </a:xfrm>
+          <a:prstGeom prst="rect">
+            <a:avLst/>
+          </a:prstGeom>
+          <a:noFill/>
+        </p:spPr>
+      </p:pic>
+      <p:sp>
+        <p:nvSpPr>
+          <p:cNvPr id="24" name="Rounded Rectangle 23"/>
+          <p:cNvSpPr/>
+          <p:nvPr/>
+        </p:nvSpPr>
+        <p:spPr>
+          <a:xfrm>
+            <a:off x="457200" y="3124200"/>
+            <a:ext cx="2743200" cy="609600"/>
+          </a:xfrm>
+          <a:prstGeom prst="roundRect">
+            <a:avLst/>
+          </a:prstGeom>
+          <a:solidFill>
+            <a:schemeClr val="tx1"/>
+          </a:solidFill>
+        </p:spPr>
+        <p:style>
+          <a:lnRef idx="2">
+            <a:schemeClr val="accent1">
+              <a:shade val="50000"/>
+            </a:schemeClr>
+          </a:lnRef>
+          <a:fillRef idx="1">
+            <a:schemeClr val="accent1"/>
+          </a:fillRef>
+          <a:effectRef idx="0">
+            <a:schemeClr val="accent1"/>
+          </a:effectRef>
+          <a:fontRef idx="minor">
+            <a:schemeClr val="lt1"/>
+          </a:fontRef>
+        </p:style>
+        <p:txBody>
+          <a:bodyPr rtlCol="0" anchor="ctr"/>
+          <a:lstStyle/>
+          <a:p>
+            <a:pPr algn="ctr"/>
+            <a:endParaRPr lang="en-US"/>
+          </a:p>
+        </p:txBody>
+      </p:sp>
+      <p:sp>
+        <p:nvSpPr>
+          <p:cNvPr id="25" name="Rounded Rectangle 24"/>
+          <p:cNvSpPr/>
+          <p:nvPr/>
+        </p:nvSpPr>
+        <p:spPr>
+          <a:xfrm>
+            <a:off x="457200" y="4495800"/>
+            <a:ext cx="2743200" cy="609600"/>
+          </a:xfrm>
+          <a:prstGeom prst="roundRect">
+            <a:avLst/>
+          </a:prstGeom>
+          <a:solidFill>
+            <a:schemeClr val="tx1"/>
+          </a:solidFill>
+        </p:spPr>
+        <p:style>
+          <a:lnRef idx="2">
+            <a:schemeClr val="accent1">
+              <a:shade val="50000"/>
+            </a:schemeClr>
+          </a:lnRef>
+          <a:fillRef idx="1">
+            <a:schemeClr val="accent1"/>
+          </a:fillRef>
+          <a:effectRef idx="0">
+            <a:schemeClr val="accent1"/>
+          </a:effectRef>
+          <a:fontRef idx="minor">
+            <a:schemeClr val="lt1"/>
+          </a:fontRef>
+        </p:style>
+        <p:txBody>
+          <a:bodyPr rtlCol="0" anchor="ctr"/>
+          <a:lstStyle/>
+          <a:p>
+            <a:pPr algn="ctr"/>
+            <a:endParaRPr lang="en-US"/>
+          </a:p>
+        </p:txBody>
+      </p:sp>
+      <p:sp>
+        <p:nvSpPr>
+          <p:cNvPr id="26" name="Rounded Rectangle 25"/>
+          <p:cNvSpPr/>
+          <p:nvPr/>
+        </p:nvSpPr>
+        <p:spPr>
+          <a:xfrm>
+            <a:off x="457200" y="5943600"/>
+            <a:ext cx="2743200" cy="609600"/>
+          </a:xfrm>
+          <a:prstGeom prst="roundRect">
+            <a:avLst/>
+          </a:prstGeom>
+          <a:solidFill>
+            <a:schemeClr val="tx1"/>
+          </a:solidFill>
+        </p:spPr>
+        <p:style>
+          <a:lnRef idx="2">
+            <a:schemeClr val="accent1">
+              <a:shade val="50000"/>
+            </a:schemeClr>
+          </a:lnRef>
+          <a:fillRef idx="1">
+            <a:schemeClr val="accent1"/>
+          </a:fillRef>
+          <a:effectRef idx="0">
+            <a:schemeClr val="accent1"/>
+          </a:effectRef>
+          <a:fontRef idx="minor">
+            <a:schemeClr val="lt1"/>
+          </a:fontRef>
+        </p:style>
+        <p:txBody>
+          <a:bodyPr rtlCol="0" anchor="ctr"/>
+          <a:lstStyle/>
+          <a:p>
+            <a:pPr algn="ctr"/>
+            <a:endParaRPr lang="en-US"/>
+          </a:p>
+        </p:txBody>
+      </p:sp>
+      <p:sp>
+        <p:nvSpPr>
+          <p:cNvPr id="27" name="Rounded Rectangle 26"/>
+          <p:cNvSpPr/>
+          <p:nvPr/>
+        </p:nvSpPr>
+        <p:spPr>
+          <a:xfrm>
+            <a:off x="4648200" y="5943600"/>
+            <a:ext cx="2743200" cy="609600"/>
+          </a:xfrm>
+          <a:prstGeom prst="roundRect">
+            <a:avLst/>
+          </a:prstGeom>
+          <a:solidFill>
+            <a:schemeClr val="tx1"/>
+          </a:solidFill>
+        </p:spPr>
+        <p:style>
+          <a:lnRef idx="2">
+            <a:schemeClr val="accent1">
+              <a:shade val="50000"/>
+            </a:schemeClr>
+          </a:lnRef>
+          <a:fillRef idx="1">
+            <a:schemeClr val="accent1"/>
+          </a:fillRef>
+          <a:effectRef idx="0">
+            <a:schemeClr val="accent1"/>
+          </a:effectRef>
+          <a:fontRef idx="minor">
+            <a:schemeClr val="lt1"/>
+          </a:fontRef>
+        </p:style>
+        <p:txBody>
+          <a:bodyPr rtlCol="0" anchor="ctr"/>
+          <a:lstStyle/>
+          <a:p>
+            <a:pPr algn="ctr"/>
+            <a:endParaRPr lang="en-US"/>
+          </a:p>
+        </p:txBody>
+      </p:sp>
+      <p:sp>
+        <p:nvSpPr>
+          <p:cNvPr id="28" name="Rounded Rectangle 27"/>
+          <p:cNvSpPr/>
+          <p:nvPr/>
+        </p:nvSpPr>
+        <p:spPr>
+          <a:xfrm>
+            <a:off x="4648200" y="4495800"/>
+            <a:ext cx="2743200" cy="609600"/>
+          </a:xfrm>
+          <a:prstGeom prst="roundRect">
+            <a:avLst/>
+          </a:prstGeom>
+          <a:solidFill>
+            <a:schemeClr val="tx1"/>
+          </a:solidFill>
+        </p:spPr>
+        <p:style>
+          <a:lnRef idx="2">
+            <a:schemeClr val="accent1">
+              <a:shade val="50000"/>
+            </a:schemeClr>
+          </a:lnRef>
+          <a:fillRef idx="1">
+            <a:schemeClr val="accent1"/>
+          </a:fillRef>
+          <a:effectRef idx="0">
+            <a:schemeClr val="accent1"/>
+          </a:effectRef>
+          <a:fontRef idx="minor">
+            <a:schemeClr val="lt1"/>
+          </a:fontRef>
+        </p:style>
+        <p:txBody>
+          <a:bodyPr rtlCol="0" anchor="ctr"/>
+          <a:lstStyle/>
+          <a:p>
+            <a:pPr algn="ctr"/>
+            <a:endParaRPr lang="en-US"/>
+          </a:p>
+        </p:txBody>
+      </p:sp>
+      <p:sp>
+        <p:nvSpPr>
+          <p:cNvPr id="29" name="Rounded Rectangle 28"/>
+          <p:cNvSpPr/>
+          <p:nvPr/>
+        </p:nvSpPr>
+        <p:spPr>
+          <a:xfrm>
+            <a:off x="4648200" y="3048000"/>
+            <a:ext cx="2743200" cy="609600"/>
+          </a:xfrm>
+          <a:prstGeom prst="roundRect">
+            <a:avLst/>
+          </a:prstGeom>
+          <a:solidFill>
+            <a:schemeClr val="tx1"/>
+          </a:solidFill>
+        </p:spPr>
+        <p:style>
+          <a:lnRef idx="2">
+            <a:schemeClr val="accent1">
+              <a:shade val="50000"/>
+            </a:schemeClr>
+          </a:lnRef>
+          <a:fillRef idx="1">
+            <a:schemeClr val="accent1"/>
+          </a:fillRef>
+          <a:effectRef idx="0">
+            <a:schemeClr val="accent1"/>
+          </a:effectRef>
+          <a:fontRef idx="minor">
+            <a:schemeClr val="lt1"/>
+          </a:fontRef>
+        </p:style>
+        <p:txBody>
+          <a:bodyPr rtlCol="0" anchor="ctr"/>
+          <a:lstStyle/>
+          <a:p>
+            <a:pPr algn="ctr"/>
+            <a:endParaRPr lang="en-US"/>
+          </a:p>
+        </p:txBody>
+      </p:sp>
+      <p:sp>
+        <p:nvSpPr>
+          <p:cNvPr id="30" name="Rounded Rectangle 29"/>
+          <p:cNvSpPr/>
+          <p:nvPr/>
+        </p:nvSpPr>
+        <p:spPr>
+          <a:xfrm>
+            <a:off x="4648200" y="1676400"/>
+            <a:ext cx="2743200" cy="609600"/>
+          </a:xfrm>
+          <a:prstGeom prst="roundRect">
+            <a:avLst/>
+          </a:prstGeom>
+          <a:solidFill>
+            <a:schemeClr val="tx1"/>
+          </a:solidFill>
+        </p:spPr>
+        <p:style>
+          <a:lnRef idx="2">
+            <a:schemeClr val="accent1">
+              <a:shade val="50000"/>
+            </a:schemeClr>
+          </a:lnRef>
+          <a:fillRef idx="1">
+            <a:schemeClr val="accent1"/>
+          </a:fillRef>
+          <a:effectRef idx="0">
+            <a:schemeClr val="accent1"/>
+          </a:effectRef>
+          <a:fontRef idx="minor">
+            <a:schemeClr val="lt1"/>
+          </a:fontRef>
+        </p:style>
+        <p:txBody>
+          <a:bodyPr rtlCol="0" anchor="ctr"/>
+          <a:lstStyle/>
+          <a:p>
+            <a:pPr algn="ctr"/>
+            <a:endParaRPr lang="en-US"/>
+          </a:p>
+        </p:txBody>
+      </p:sp>
+      <p:sp>
+        <p:nvSpPr>
+          <p:cNvPr id="3" name="Content Placeholder 2"/>
+          <p:cNvSpPr>
+            <a:spLocks noGrp="1"/>
+          </p:cNvSpPr>
+          <p:nvPr>
+            <p:ph idx="1"/>
+          </p:nvPr>
+        </p:nvSpPr>
+        <p:spPr>
+          <a:xfrm>
+            <a:off x="762000" y="1600200"/>
+            <a:ext cx="8229600" cy="5029200"/>
+          </a:xfrm>
+        </p:spPr>
+        <p:txBody>
+          <a:bodyPr>
+            <a:normAutofit/>
+          </a:bodyPr>
+          <a:lstStyle/>
+          <a:p>
+            <a:pPr>
+              <a:buNone/>
+            </a:pPr>
+            <a:r>
+              <a:rPr lang="en-US" sz="4000" dirty="0" smtClean="0">
+                <a:solidFill>
+                  <a:schemeClr val="bg1"/>
+                </a:solidFill>
+              </a:rPr>
+              <a:t>Batman</a:t>
+            </a:r>
+            <a:r>
+              <a:rPr lang="en-US" sz="4000" dirty="0" smtClean="0"/>
+              <a:t>			       </a:t>
+            </a:r>
+            <a:r>
+              <a:rPr lang="en-US" sz="4000" dirty="0" smtClean="0">
+                <a:solidFill>
+                  <a:schemeClr val="bg1"/>
+                </a:solidFill>
+              </a:rPr>
+              <a:t> Floor</a:t>
+            </a:r>
+          </a:p>
+          <a:p>
+            <a:pPr>
+              <a:buNone/>
+            </a:pPr>
+            <a:endParaRPr lang="en-US" sz="4000" dirty="0" smtClean="0"/>
+          </a:p>
+          <a:p>
+            <a:pPr>
+              <a:buNone/>
+            </a:pPr>
+            <a:r>
+              <a:rPr lang="en-US" sz="4000" dirty="0" err="1" smtClean="0">
+                <a:solidFill>
+                  <a:schemeClr val="bg1"/>
+                </a:solidFill>
+              </a:rPr>
+              <a:t>Nightwing</a:t>
+            </a:r>
+            <a:r>
+              <a:rPr lang="en-US" sz="4000" dirty="0" smtClean="0"/>
+              <a:t>		       </a:t>
+            </a:r>
+            <a:r>
+              <a:rPr lang="en-US" sz="4000" dirty="0" smtClean="0">
+                <a:solidFill>
+                  <a:schemeClr val="bg1"/>
+                </a:solidFill>
+              </a:rPr>
+              <a:t> Wall</a:t>
+            </a:r>
+          </a:p>
+          <a:p>
+            <a:pPr>
+              <a:buNone/>
+            </a:pPr>
+            <a:endParaRPr lang="en-US" dirty="0" smtClean="0"/>
+          </a:p>
+          <a:p>
+            <a:pPr>
+              <a:buNone/>
+            </a:pPr>
+            <a:r>
+              <a:rPr lang="en-US" sz="4300" dirty="0" smtClean="0">
+                <a:solidFill>
+                  <a:schemeClr val="bg1"/>
+                </a:solidFill>
+              </a:rPr>
+              <a:t>Batgirl</a:t>
+            </a:r>
+            <a:r>
+              <a:rPr lang="en-US" sz="4300" dirty="0" smtClean="0"/>
+              <a:t>			</a:t>
+            </a:r>
+            <a:r>
+              <a:rPr lang="en-US" sz="4300" dirty="0" smtClean="0">
+                <a:solidFill>
+                  <a:schemeClr val="bg1"/>
+                </a:solidFill>
+              </a:rPr>
+              <a:t>       IC</a:t>
+            </a:r>
+          </a:p>
+          <a:p>
+            <a:pPr>
+              <a:buNone/>
+            </a:pPr>
+            <a:endParaRPr lang="en-US" sz="4000" dirty="0" smtClean="0"/>
+          </a:p>
+          <a:p>
+            <a:pPr>
+              <a:buNone/>
+            </a:pPr>
+            <a:r>
+              <a:rPr lang="en-US" sz="4000" dirty="0" smtClean="0">
+                <a:solidFill>
+                  <a:schemeClr val="bg1"/>
+                </a:solidFill>
+              </a:rPr>
+              <a:t>Red </a:t>
+            </a:r>
+            <a:r>
+              <a:rPr lang="en-US" sz="4000" dirty="0" smtClean="0">
+                <a:solidFill>
+                  <a:schemeClr val="bg1"/>
+                </a:solidFill>
+              </a:rPr>
+              <a:t>Robin </a:t>
+            </a:r>
+            <a:r>
+              <a:rPr lang="en-US" sz="4000" dirty="0" smtClean="0"/>
+              <a:t>			</a:t>
+            </a:r>
+            <a:r>
+              <a:rPr lang="en-US" sz="4000" dirty="0" smtClean="0">
+                <a:solidFill>
+                  <a:schemeClr val="bg1"/>
+                </a:solidFill>
+              </a:rPr>
+              <a:t>Joker</a:t>
+            </a:r>
+            <a:endParaRPr lang="en-US" sz="4000" dirty="0" smtClean="0">
+              <a:solidFill>
+                <a:schemeClr val="bg1"/>
+              </a:solidFill>
+            </a:endParaRPr>
+          </a:p>
+          <a:p>
+            <a:pPr>
+              <a:buNone/>
+            </a:pPr>
+            <a:endParaRPr lang="en-US" dirty="0"/>
+          </a:p>
+        </p:txBody>
+      </p:sp>
     </p:spTree>
   </p:cSld>
   <p:clrMapOvr>
@@ -3766,203 +4289,171 @@
           <a:chExt cx="0" cy="0"/>
         </a:xfrm>
       </p:grpSpPr>
-      <p:sp>
-        <p:nvSpPr>
-          <p:cNvPr id="2" name="Title 1"/>
-          <p:cNvSpPr>
-            <a:spLocks noGrp="1"/>
-          </p:cNvSpPr>
-          <p:nvPr>
-            <p:ph type="title"/>
-          </p:nvPr>
-        </p:nvSpPr>
-        <p:spPr/>
-        <p:txBody>
-          <a:bodyPr>
-            <a:normAutofit fontScale="90000"/>
-          </a:bodyPr>
-          <a:lstStyle/>
-          <a:p>
-            <a:r>
-              <a:rPr lang="en-US" dirty="0" err="1" smtClean="0">
-                <a:solidFill>
-                  <a:schemeClr val="accent1"/>
-                </a:solidFill>
-              </a:rPr>
-              <a:t>Objek-objek</a:t>
-            </a:r>
-            <a:r>
-              <a:rPr lang="en-US" dirty="0" smtClean="0">
-                <a:solidFill>
-                  <a:schemeClr val="accent1"/>
-                </a:solidFill>
-              </a:rPr>
-              <a:t> yang </a:t>
-            </a:r>
-            <a:r>
-              <a:rPr lang="en-US" dirty="0" err="1" smtClean="0">
-                <a:solidFill>
-                  <a:schemeClr val="accent1"/>
-                </a:solidFill>
-              </a:rPr>
-              <a:t>terdapat</a:t>
-            </a:r>
-            <a:r>
-              <a:rPr lang="en-US" dirty="0" smtClean="0">
-                <a:solidFill>
-                  <a:schemeClr val="accent1"/>
-                </a:solidFill>
-              </a:rPr>
-              <a:t> </a:t>
-            </a:r>
-            <a:r>
-              <a:rPr lang="en-US" dirty="0" err="1" smtClean="0">
-                <a:solidFill>
-                  <a:schemeClr val="accent1"/>
-                </a:solidFill>
-              </a:rPr>
-              <a:t>pada</a:t>
-            </a:r>
-            <a:r>
-              <a:rPr lang="en-US" dirty="0" smtClean="0">
-                <a:solidFill>
-                  <a:schemeClr val="accent1"/>
-                </a:solidFill>
-              </a:rPr>
-              <a:t> Batman’s Challenge</a:t>
-            </a:r>
-            <a:endParaRPr lang="en-US" dirty="0"/>
-          </a:p>
-        </p:txBody>
-      </p:sp>
-      <p:sp>
-        <p:nvSpPr>
-          <p:cNvPr id="5" name="Content Placeholder 4"/>
-          <p:cNvSpPr>
-            <a:spLocks noGrp="1"/>
-          </p:cNvSpPr>
-          <p:nvPr>
-            <p:ph sz="half" idx="2"/>
-          </p:nvPr>
-        </p:nvSpPr>
-        <p:spPr/>
-        <p:txBody>
-          <a:bodyPr/>
-          <a:lstStyle/>
-          <a:p>
-            <a:r>
-              <a:rPr lang="en-US" dirty="0" smtClean="0"/>
-              <a:t>Blue Shoes</a:t>
-            </a:r>
-          </a:p>
-          <a:p>
-            <a:endParaRPr lang="en-US" dirty="0" smtClean="0"/>
-          </a:p>
-          <a:p>
-            <a:endParaRPr lang="en-US" dirty="0" smtClean="0"/>
-          </a:p>
-          <a:p>
-            <a:r>
-              <a:rPr lang="en-US" dirty="0" smtClean="0"/>
-              <a:t>Barrier </a:t>
-            </a:r>
-          </a:p>
-          <a:p>
-            <a:endParaRPr lang="en-US" dirty="0" smtClean="0"/>
-          </a:p>
-          <a:p>
-            <a:endParaRPr lang="en-US" dirty="0" smtClean="0"/>
-          </a:p>
-          <a:p>
-            <a:r>
-              <a:rPr lang="en-US" dirty="0" smtClean="0"/>
-              <a:t>Finish  </a:t>
-            </a:r>
-          </a:p>
-          <a:p>
-            <a:endParaRPr lang="en-US" dirty="0"/>
-          </a:p>
-        </p:txBody>
-      </p:sp>
-      <p:sp>
-        <p:nvSpPr>
-          <p:cNvPr id="8" name="Content Placeholder 7"/>
-          <p:cNvSpPr>
-            <a:spLocks noGrp="1"/>
-          </p:cNvSpPr>
-          <p:nvPr>
-            <p:ph sz="half" idx="1"/>
-          </p:nvPr>
-        </p:nvSpPr>
-        <p:spPr/>
-        <p:txBody>
-          <a:bodyPr/>
-          <a:lstStyle/>
-          <a:p>
-            <a:r>
-              <a:rPr lang="en-US" dirty="0" smtClean="0"/>
-              <a:t>Fire</a:t>
-            </a:r>
-          </a:p>
-          <a:p>
-            <a:pPr>
-              <a:buNone/>
-            </a:pPr>
-            <a:endParaRPr lang="en-US" dirty="0" smtClean="0"/>
-          </a:p>
-          <a:p>
-            <a:pPr>
-              <a:buNone/>
-            </a:pPr>
-            <a:endParaRPr lang="en-US" dirty="0" smtClean="0"/>
-          </a:p>
-          <a:p>
-            <a:r>
-              <a:rPr lang="en-US" dirty="0" smtClean="0"/>
-              <a:t>Water </a:t>
-            </a:r>
-          </a:p>
-          <a:p>
-            <a:pPr>
-              <a:buNone/>
-            </a:pPr>
-            <a:endParaRPr lang="en-US" dirty="0" smtClean="0"/>
-          </a:p>
-          <a:p>
-            <a:endParaRPr lang="en-US" dirty="0" smtClean="0"/>
-          </a:p>
-          <a:p>
-            <a:r>
-              <a:rPr lang="en-US" dirty="0" smtClean="0"/>
-              <a:t>Red Shoes</a:t>
-            </a:r>
-          </a:p>
-        </p:txBody>
-      </p:sp>
       <p:pic>
         <p:nvPicPr>
-          <p:cNvPr id="9" name="Content Placeholder 3" descr="Fire.jpg"/>
+          <p:cNvPr id="15" name="Picture 14" descr="Gotham.jpg"/>
           <p:cNvPicPr>
             <a:picLocks noChangeAspect="1"/>
           </p:cNvPicPr>
           <p:nvPr/>
         </p:nvPicPr>
         <p:blipFill>
-          <a:blip r:embed="rId2" cstate="print"/>
+          <a:blip r:embed="rId2"/>
           <a:stretch>
             <a:fillRect/>
           </a:stretch>
         </p:blipFill>
         <p:spPr>
           <a:xfrm>
-            <a:off x="2743200" y="1600200"/>
-            <a:ext cx="990600" cy="990600"/>
+            <a:off x="0" y="0"/>
+            <a:ext cx="9144000" cy="6858000"/>
           </a:xfrm>
           <a:prstGeom prst="rect">
             <a:avLst/>
           </a:prstGeom>
         </p:spPr>
       </p:pic>
+      <p:sp>
+        <p:nvSpPr>
+          <p:cNvPr id="11" name="Rounded Rectangle 10"/>
+          <p:cNvSpPr/>
+          <p:nvPr/>
+        </p:nvSpPr>
+        <p:spPr>
+          <a:xfrm>
+            <a:off x="304800" y="152400"/>
+            <a:ext cx="8534400" cy="1143000"/>
+          </a:xfrm>
+          <a:prstGeom prst="roundRect">
+            <a:avLst/>
+          </a:prstGeom>
+          <a:solidFill>
+            <a:schemeClr val="tx1"/>
+          </a:solidFill>
+        </p:spPr>
+        <p:style>
+          <a:lnRef idx="2">
+            <a:schemeClr val="accent1">
+              <a:shade val="50000"/>
+            </a:schemeClr>
+          </a:lnRef>
+          <a:fillRef idx="1">
+            <a:schemeClr val="accent1"/>
+          </a:fillRef>
+          <a:effectRef idx="0">
+            <a:schemeClr val="accent1"/>
+          </a:effectRef>
+          <a:fontRef idx="minor">
+            <a:schemeClr val="lt1"/>
+          </a:fontRef>
+        </p:style>
+        <p:txBody>
+          <a:bodyPr rtlCol="0" anchor="ctr"/>
+          <a:lstStyle/>
+          <a:p>
+            <a:pPr algn="ctr"/>
+            <a:endParaRPr lang="en-US" dirty="0">
+              <a:solidFill>
+                <a:srgbClr val="FF0000"/>
+              </a:solidFill>
+            </a:endParaRPr>
+          </a:p>
+        </p:txBody>
+      </p:sp>
+      <p:sp>
+        <p:nvSpPr>
+          <p:cNvPr id="2" name="Title 1"/>
+          <p:cNvSpPr>
+            <a:spLocks noGrp="1"/>
+          </p:cNvSpPr>
+          <p:nvPr>
+            <p:ph type="title"/>
+          </p:nvPr>
+        </p:nvSpPr>
+        <p:spPr>
+          <a:xfrm>
+            <a:off x="457200" y="152400"/>
+            <a:ext cx="8229600" cy="1143000"/>
+          </a:xfrm>
+        </p:spPr>
+        <p:txBody>
+          <a:bodyPr>
+            <a:normAutofit/>
+          </a:bodyPr>
+          <a:lstStyle/>
+          <a:p>
+            <a:r>
+              <a:rPr lang="en-US" sz="3000" dirty="0" err="1" smtClean="0">
+                <a:solidFill>
+                  <a:schemeClr val="bg1"/>
+                </a:solidFill>
+              </a:rPr>
+              <a:t>Objek-objek</a:t>
+            </a:r>
+            <a:r>
+              <a:rPr lang="en-US" sz="3000" dirty="0" smtClean="0">
+                <a:solidFill>
+                  <a:schemeClr val="bg1"/>
+                </a:solidFill>
+              </a:rPr>
+              <a:t> yang </a:t>
+            </a:r>
+            <a:r>
+              <a:rPr lang="en-US" sz="3000" dirty="0" err="1" smtClean="0">
+                <a:solidFill>
+                  <a:schemeClr val="bg1"/>
+                </a:solidFill>
+              </a:rPr>
+              <a:t>terdapat</a:t>
+            </a:r>
+            <a:r>
+              <a:rPr lang="en-US" sz="3000" dirty="0" smtClean="0">
+                <a:solidFill>
+                  <a:schemeClr val="bg1"/>
+                </a:solidFill>
+              </a:rPr>
+              <a:t> </a:t>
+            </a:r>
+            <a:r>
+              <a:rPr lang="en-US" sz="3000" dirty="0" err="1" smtClean="0">
+                <a:solidFill>
+                  <a:schemeClr val="bg1"/>
+                </a:solidFill>
+              </a:rPr>
+              <a:t>pada</a:t>
+            </a:r>
+            <a:r>
+              <a:rPr lang="en-US" sz="3000" dirty="0" smtClean="0">
+                <a:solidFill>
+                  <a:schemeClr val="bg1"/>
+                </a:solidFill>
+              </a:rPr>
+              <a:t> Batman’s </a:t>
+            </a:r>
+            <a:r>
+              <a:rPr lang="en-US" sz="3000" dirty="0" smtClean="0">
+                <a:solidFill>
+                  <a:schemeClr val="bg1"/>
+                </a:solidFill>
+              </a:rPr>
+              <a:t>Challenge</a:t>
+            </a:r>
+            <a:r>
+              <a:rPr lang="en-US" sz="3000" dirty="0" smtClean="0">
+                <a:solidFill>
+                  <a:schemeClr val="bg1"/>
+                </a:solidFill>
+              </a:rPr>
+              <a:t>(Cont..)</a:t>
+            </a:r>
+            <a:endParaRPr lang="en-US" sz="3000" dirty="0">
+              <a:solidFill>
+                <a:schemeClr val="bg1"/>
+              </a:solidFill>
+            </a:endParaRPr>
+          </a:p>
+        </p:txBody>
+      </p:sp>
       <p:pic>
         <p:nvPicPr>
           <p:cNvPr id="1026" name="Picture 2" descr="D:\KULIAH\SEM 9\ADBO\TA\Chips-challenge\Chip\Image\Water.gif"/>
@@ -3981,7 +4472,7 @@
         <p:spPr bwMode="auto">
           <a:xfrm>
             <a:off x="2667000" y="3048000"/>
-            <a:ext cx="990600" cy="990600"/>
+            <a:ext cx="838200" cy="838200"/>
           </a:xfrm>
           <a:prstGeom prst="rect">
             <a:avLst/>
@@ -4007,7 +4498,7 @@
         <p:spPr bwMode="auto">
           <a:xfrm>
             <a:off x="2667000" y="4572000"/>
-            <a:ext cx="990600" cy="990600"/>
+            <a:ext cx="838200" cy="838200"/>
           </a:xfrm>
           <a:prstGeom prst="rect">
             <a:avLst/>
@@ -4089,6 +4580,454 @@
           </a:prstGeom>
         </p:spPr>
       </p:pic>
+      <p:pic>
+        <p:nvPicPr>
+          <p:cNvPr id="2050" name="Picture 2" descr="D:\TA ADBO CHIP\Chips-challenge\Chip\Image\Fire.gif"/>
+          <p:cNvPicPr>
+            <a:picLocks noChangeAspect="1" noChangeArrowheads="1" noCrop="1"/>
+          </p:cNvPicPr>
+          <p:nvPr/>
+        </p:nvPicPr>
+        <p:blipFill>
+          <a:blip r:embed="rId8"/>
+          <a:srcRect/>
+          <a:stretch>
+            <a:fillRect/>
+          </a:stretch>
+        </p:blipFill>
+        <p:spPr bwMode="auto">
+          <a:xfrm>
+            <a:off x="2590800" y="1524000"/>
+            <a:ext cx="936625" cy="936625"/>
+          </a:xfrm>
+          <a:prstGeom prst="rect">
+            <a:avLst/>
+          </a:prstGeom>
+          <a:noFill/>
+        </p:spPr>
+      </p:pic>
+      <p:sp>
+        <p:nvSpPr>
+          <p:cNvPr id="16" name="Rounded Rectangle 15"/>
+          <p:cNvSpPr/>
+          <p:nvPr/>
+        </p:nvSpPr>
+        <p:spPr>
+          <a:xfrm>
+            <a:off x="228600" y="1600200"/>
+            <a:ext cx="2286000" cy="609600"/>
+          </a:xfrm>
+          <a:prstGeom prst="roundRect">
+            <a:avLst/>
+          </a:prstGeom>
+          <a:solidFill>
+            <a:schemeClr val="tx1"/>
+          </a:solidFill>
+        </p:spPr>
+        <p:style>
+          <a:lnRef idx="2">
+            <a:schemeClr val="accent1">
+              <a:shade val="50000"/>
+            </a:schemeClr>
+          </a:lnRef>
+          <a:fillRef idx="1">
+            <a:schemeClr val="accent1"/>
+          </a:fillRef>
+          <a:effectRef idx="0">
+            <a:schemeClr val="accent1"/>
+          </a:effectRef>
+          <a:fontRef idx="minor">
+            <a:schemeClr val="lt1"/>
+          </a:fontRef>
+        </p:style>
+        <p:txBody>
+          <a:bodyPr rtlCol="0" anchor="ctr"/>
+          <a:lstStyle/>
+          <a:p>
+            <a:pPr algn="ctr"/>
+            <a:endParaRPr lang="en-US"/>
+          </a:p>
+        </p:txBody>
+      </p:sp>
+      <p:sp>
+        <p:nvSpPr>
+          <p:cNvPr id="17" name="Rounded Rectangle 16"/>
+          <p:cNvSpPr/>
+          <p:nvPr/>
+        </p:nvSpPr>
+        <p:spPr>
+          <a:xfrm>
+            <a:off x="228600" y="3048000"/>
+            <a:ext cx="2286000" cy="609600"/>
+          </a:xfrm>
+          <a:prstGeom prst="roundRect">
+            <a:avLst/>
+          </a:prstGeom>
+          <a:solidFill>
+            <a:schemeClr val="tx1"/>
+          </a:solidFill>
+        </p:spPr>
+        <p:style>
+          <a:lnRef idx="2">
+            <a:schemeClr val="accent1">
+              <a:shade val="50000"/>
+            </a:schemeClr>
+          </a:lnRef>
+          <a:fillRef idx="1">
+            <a:schemeClr val="accent1"/>
+          </a:fillRef>
+          <a:effectRef idx="0">
+            <a:schemeClr val="accent1"/>
+          </a:effectRef>
+          <a:fontRef idx="minor">
+            <a:schemeClr val="lt1"/>
+          </a:fontRef>
+        </p:style>
+        <p:txBody>
+          <a:bodyPr rtlCol="0" anchor="ctr"/>
+          <a:lstStyle/>
+          <a:p>
+            <a:pPr algn="ctr"/>
+            <a:endParaRPr lang="en-US"/>
+          </a:p>
+        </p:txBody>
+      </p:sp>
+      <p:sp>
+        <p:nvSpPr>
+          <p:cNvPr id="18" name="Rounded Rectangle 17"/>
+          <p:cNvSpPr/>
+          <p:nvPr/>
+        </p:nvSpPr>
+        <p:spPr>
+          <a:xfrm>
+            <a:off x="228600" y="4648200"/>
+            <a:ext cx="2286000" cy="609600"/>
+          </a:xfrm>
+          <a:prstGeom prst="roundRect">
+            <a:avLst/>
+          </a:prstGeom>
+          <a:solidFill>
+            <a:schemeClr val="tx1"/>
+          </a:solidFill>
+        </p:spPr>
+        <p:style>
+          <a:lnRef idx="2">
+            <a:schemeClr val="accent1">
+              <a:shade val="50000"/>
+            </a:schemeClr>
+          </a:lnRef>
+          <a:fillRef idx="1">
+            <a:schemeClr val="accent1"/>
+          </a:fillRef>
+          <a:effectRef idx="0">
+            <a:schemeClr val="accent1"/>
+          </a:effectRef>
+          <a:fontRef idx="minor">
+            <a:schemeClr val="lt1"/>
+          </a:fontRef>
+        </p:style>
+        <p:txBody>
+          <a:bodyPr rtlCol="0" anchor="ctr"/>
+          <a:lstStyle/>
+          <a:p>
+            <a:pPr algn="ctr"/>
+            <a:endParaRPr lang="en-US"/>
+          </a:p>
+        </p:txBody>
+      </p:sp>
+      <p:sp>
+        <p:nvSpPr>
+          <p:cNvPr id="19" name="Rounded Rectangle 18"/>
+          <p:cNvSpPr/>
+          <p:nvPr/>
+        </p:nvSpPr>
+        <p:spPr>
+          <a:xfrm>
+            <a:off x="4572000" y="1600200"/>
+            <a:ext cx="2286000" cy="609600"/>
+          </a:xfrm>
+          <a:prstGeom prst="roundRect">
+            <a:avLst/>
+          </a:prstGeom>
+          <a:solidFill>
+            <a:schemeClr val="tx1"/>
+          </a:solidFill>
+        </p:spPr>
+        <p:style>
+          <a:lnRef idx="2">
+            <a:schemeClr val="accent1">
+              <a:shade val="50000"/>
+            </a:schemeClr>
+          </a:lnRef>
+          <a:fillRef idx="1">
+            <a:schemeClr val="accent1"/>
+          </a:fillRef>
+          <a:effectRef idx="0">
+            <a:schemeClr val="accent1"/>
+          </a:effectRef>
+          <a:fontRef idx="minor">
+            <a:schemeClr val="lt1"/>
+          </a:fontRef>
+        </p:style>
+        <p:txBody>
+          <a:bodyPr rtlCol="0" anchor="ctr"/>
+          <a:lstStyle/>
+          <a:p>
+            <a:pPr algn="ctr"/>
+            <a:endParaRPr lang="en-US"/>
+          </a:p>
+        </p:txBody>
+      </p:sp>
+      <p:sp>
+        <p:nvSpPr>
+          <p:cNvPr id="20" name="Rounded Rectangle 19"/>
+          <p:cNvSpPr/>
+          <p:nvPr/>
+        </p:nvSpPr>
+        <p:spPr>
+          <a:xfrm>
+            <a:off x="4572000" y="3124200"/>
+            <a:ext cx="2286000" cy="609600"/>
+          </a:xfrm>
+          <a:prstGeom prst="roundRect">
+            <a:avLst/>
+          </a:prstGeom>
+          <a:solidFill>
+            <a:schemeClr val="tx1"/>
+          </a:solidFill>
+        </p:spPr>
+        <p:style>
+          <a:lnRef idx="2">
+            <a:schemeClr val="accent1">
+              <a:shade val="50000"/>
+            </a:schemeClr>
+          </a:lnRef>
+          <a:fillRef idx="1">
+            <a:schemeClr val="accent1"/>
+          </a:fillRef>
+          <a:effectRef idx="0">
+            <a:schemeClr val="accent1"/>
+          </a:effectRef>
+          <a:fontRef idx="minor">
+            <a:schemeClr val="lt1"/>
+          </a:fontRef>
+        </p:style>
+        <p:txBody>
+          <a:bodyPr rtlCol="0" anchor="ctr"/>
+          <a:lstStyle/>
+          <a:p>
+            <a:pPr algn="ctr"/>
+            <a:endParaRPr lang="en-US"/>
+          </a:p>
+        </p:txBody>
+      </p:sp>
+      <p:sp>
+        <p:nvSpPr>
+          <p:cNvPr id="21" name="Rounded Rectangle 20"/>
+          <p:cNvSpPr/>
+          <p:nvPr/>
+        </p:nvSpPr>
+        <p:spPr>
+          <a:xfrm>
+            <a:off x="4572000" y="4648200"/>
+            <a:ext cx="2286000" cy="609600"/>
+          </a:xfrm>
+          <a:prstGeom prst="roundRect">
+            <a:avLst/>
+          </a:prstGeom>
+          <a:solidFill>
+            <a:schemeClr val="tx1"/>
+          </a:solidFill>
+        </p:spPr>
+        <p:style>
+          <a:lnRef idx="2">
+            <a:schemeClr val="accent1">
+              <a:shade val="50000"/>
+            </a:schemeClr>
+          </a:lnRef>
+          <a:fillRef idx="1">
+            <a:schemeClr val="accent1"/>
+          </a:fillRef>
+          <a:effectRef idx="0">
+            <a:schemeClr val="accent1"/>
+          </a:effectRef>
+          <a:fontRef idx="minor">
+            <a:schemeClr val="lt1"/>
+          </a:fontRef>
+        </p:style>
+        <p:txBody>
+          <a:bodyPr rtlCol="0" anchor="ctr"/>
+          <a:lstStyle/>
+          <a:p>
+            <a:pPr algn="ctr"/>
+            <a:endParaRPr lang="en-US"/>
+          </a:p>
+        </p:txBody>
+      </p:sp>
+      <p:sp>
+        <p:nvSpPr>
+          <p:cNvPr id="8" name="Content Placeholder 7"/>
+          <p:cNvSpPr>
+            <a:spLocks noGrp="1"/>
+          </p:cNvSpPr>
+          <p:nvPr>
+            <p:ph sz="half" idx="1"/>
+          </p:nvPr>
+        </p:nvSpPr>
+        <p:spPr/>
+        <p:txBody>
+          <a:bodyPr/>
+          <a:lstStyle/>
+          <a:p>
+            <a:r>
+              <a:rPr lang="en-US" dirty="0" smtClean="0">
+                <a:solidFill>
+                  <a:schemeClr val="bg1"/>
+                </a:solidFill>
+              </a:rPr>
+              <a:t>Fire</a:t>
+            </a:r>
+          </a:p>
+          <a:p>
+            <a:pPr>
+              <a:buNone/>
+            </a:pPr>
+            <a:endParaRPr lang="en-US" dirty="0" smtClean="0">
+              <a:solidFill>
+                <a:schemeClr val="bg1"/>
+              </a:solidFill>
+            </a:endParaRPr>
+          </a:p>
+          <a:p>
+            <a:pPr>
+              <a:buNone/>
+            </a:pPr>
+            <a:endParaRPr lang="en-US" dirty="0" smtClean="0">
+              <a:solidFill>
+                <a:schemeClr val="bg1"/>
+              </a:solidFill>
+            </a:endParaRPr>
+          </a:p>
+          <a:p>
+            <a:r>
+              <a:rPr lang="en-US" dirty="0" smtClean="0">
+                <a:solidFill>
+                  <a:schemeClr val="bg1"/>
+                </a:solidFill>
+              </a:rPr>
+              <a:t>Water </a:t>
+            </a:r>
+          </a:p>
+          <a:p>
+            <a:pPr>
+              <a:buNone/>
+            </a:pPr>
+            <a:endParaRPr lang="en-US" dirty="0" smtClean="0">
+              <a:solidFill>
+                <a:schemeClr val="bg1"/>
+              </a:solidFill>
+            </a:endParaRPr>
+          </a:p>
+          <a:p>
+            <a:endParaRPr lang="en-US" dirty="0" smtClean="0">
+              <a:solidFill>
+                <a:schemeClr val="bg1"/>
+              </a:solidFill>
+            </a:endParaRPr>
+          </a:p>
+          <a:p>
+            <a:r>
+              <a:rPr lang="en-US" dirty="0" smtClean="0">
+                <a:solidFill>
+                  <a:schemeClr val="bg1"/>
+                </a:solidFill>
+              </a:rPr>
+              <a:t>Red Shoes</a:t>
+            </a:r>
+          </a:p>
+        </p:txBody>
+      </p:sp>
+      <p:sp>
+        <p:nvSpPr>
+          <p:cNvPr id="5" name="Content Placeholder 4"/>
+          <p:cNvSpPr>
+            <a:spLocks noGrp="1"/>
+          </p:cNvSpPr>
+          <p:nvPr>
+            <p:ph sz="half" idx="2"/>
+          </p:nvPr>
+        </p:nvSpPr>
+        <p:spPr/>
+        <p:txBody>
+          <a:bodyPr/>
+          <a:lstStyle/>
+          <a:p>
+            <a:r>
+              <a:rPr lang="en-US" dirty="0" smtClean="0">
+                <a:solidFill>
+                  <a:schemeClr val="bg1"/>
+                </a:solidFill>
+              </a:rPr>
+              <a:t>Blue Shoes</a:t>
+            </a:r>
+          </a:p>
+          <a:p>
+            <a:endParaRPr lang="en-US" dirty="0" smtClean="0">
+              <a:solidFill>
+                <a:schemeClr val="bg1"/>
+              </a:solidFill>
+            </a:endParaRPr>
+          </a:p>
+          <a:p>
+            <a:endParaRPr lang="en-US" dirty="0" smtClean="0">
+              <a:solidFill>
+                <a:schemeClr val="bg1"/>
+              </a:solidFill>
+            </a:endParaRPr>
+          </a:p>
+          <a:p>
+            <a:r>
+              <a:rPr lang="en-US" dirty="0" smtClean="0">
+                <a:solidFill>
+                  <a:schemeClr val="bg1"/>
+                </a:solidFill>
+              </a:rPr>
+              <a:t>Barrier </a:t>
+            </a:r>
+          </a:p>
+          <a:p>
+            <a:endParaRPr lang="en-US" dirty="0" smtClean="0">
+              <a:solidFill>
+                <a:schemeClr val="bg1"/>
+              </a:solidFill>
+            </a:endParaRPr>
+          </a:p>
+          <a:p>
+            <a:endParaRPr lang="en-US" dirty="0" smtClean="0">
+              <a:solidFill>
+                <a:schemeClr val="bg1"/>
+              </a:solidFill>
+            </a:endParaRPr>
+          </a:p>
+          <a:p>
+            <a:r>
+              <a:rPr lang="en-US" dirty="0" smtClean="0">
+                <a:solidFill>
+                  <a:schemeClr val="bg1"/>
+                </a:solidFill>
+              </a:rPr>
+              <a:t>Finish  </a:t>
+            </a:r>
+          </a:p>
+          <a:p>
+            <a:endParaRPr lang="en-US" dirty="0">
+              <a:solidFill>
+                <a:schemeClr val="bg1"/>
+              </a:solidFill>
+            </a:endParaRPr>
+          </a:p>
+        </p:txBody>
+      </p:sp>
     </p:spTree>
   </p:cSld>
   <p:clrMapOvr>
@@ -4123,13 +5062,11 @@
       </p:grpSpPr>
       <p:pic>
         <p:nvPicPr>
-          <p:cNvPr id="4" name="Content Placeholder 3" descr="uml 20 november.jpg"/>
+          <p:cNvPr id="5" name="Picture 4" descr="Gotham.jpg"/>
           <p:cNvPicPr>
-            <a:picLocks noGrp="1" noChangeAspect="1"/>
+            <a:picLocks noChangeAspect="1"/>
           </p:cNvPicPr>
-          <p:nvPr>
-            <p:ph idx="1"/>
-          </p:nvPr>
+          <p:nvPr/>
         </p:nvPicPr>
         <p:blipFill>
           <a:blip r:embed="rId2"/>
@@ -4139,9 +5076,468 @@
         </p:blipFill>
         <p:spPr>
           <a:xfrm>
-            <a:off x="0" y="-1"/>
-            <a:ext cx="9144000" cy="7303111"/>
-          </a:xfrm>
+            <a:off x="0" y="0"/>
+            <a:ext cx="9144000" cy="6858000"/>
+          </a:xfrm>
+          <a:prstGeom prst="rect">
+            <a:avLst/>
+          </a:prstGeom>
+        </p:spPr>
+      </p:pic>
+      <p:sp>
+        <p:nvSpPr>
+          <p:cNvPr id="2" name="Title 1"/>
+          <p:cNvSpPr>
+            <a:spLocks noGrp="1"/>
+          </p:cNvSpPr>
+          <p:nvPr>
+            <p:ph type="title"/>
+          </p:nvPr>
+        </p:nvSpPr>
+        <p:spPr/>
+        <p:txBody>
+          <a:bodyPr/>
+          <a:lstStyle/>
+          <a:p>
+            <a:endParaRPr lang="en-US"/>
+          </a:p>
+        </p:txBody>
+      </p:sp>
+      <p:sp>
+        <p:nvSpPr>
+          <p:cNvPr id="9" name="Rounded Rectangle 8"/>
+          <p:cNvSpPr/>
+          <p:nvPr/>
+        </p:nvSpPr>
+        <p:spPr>
+          <a:xfrm>
+            <a:off x="457200" y="1676400"/>
+            <a:ext cx="3352800" cy="4495800"/>
+          </a:xfrm>
+          <a:prstGeom prst="roundRect">
+            <a:avLst/>
+          </a:prstGeom>
+          <a:solidFill>
+            <a:schemeClr val="tx1"/>
+          </a:solidFill>
+        </p:spPr>
+        <p:style>
+          <a:lnRef idx="2">
+            <a:schemeClr val="accent1">
+              <a:shade val="50000"/>
+            </a:schemeClr>
+          </a:lnRef>
+          <a:fillRef idx="1">
+            <a:schemeClr val="accent1"/>
+          </a:fillRef>
+          <a:effectRef idx="0">
+            <a:schemeClr val="accent1"/>
+          </a:effectRef>
+          <a:fontRef idx="minor">
+            <a:schemeClr val="lt1"/>
+          </a:fontRef>
+        </p:style>
+        <p:txBody>
+          <a:bodyPr rtlCol="0" anchor="ctr"/>
+          <a:lstStyle/>
+          <a:p>
+            <a:pPr algn="ctr"/>
+            <a:endParaRPr lang="en-US"/>
+          </a:p>
+        </p:txBody>
+      </p:sp>
+      <p:sp>
+        <p:nvSpPr>
+          <p:cNvPr id="4" name="Content Placeholder 3"/>
+          <p:cNvSpPr>
+            <a:spLocks noGrp="1"/>
+          </p:cNvSpPr>
+          <p:nvPr>
+            <p:ph sz="half" idx="2"/>
+          </p:nvPr>
+        </p:nvSpPr>
+        <p:spPr/>
+        <p:txBody>
+          <a:bodyPr/>
+          <a:lstStyle/>
+          <a:p>
+            <a:endParaRPr lang="en-US" dirty="0"/>
+          </a:p>
+        </p:txBody>
+      </p:sp>
+      <p:sp>
+        <p:nvSpPr>
+          <p:cNvPr id="6" name="Rounded Rectangle 5"/>
+          <p:cNvSpPr/>
+          <p:nvPr/>
+        </p:nvSpPr>
+        <p:spPr>
+          <a:xfrm>
+            <a:off x="304800" y="152400"/>
+            <a:ext cx="8534400" cy="1143000"/>
+          </a:xfrm>
+          <a:prstGeom prst="roundRect">
+            <a:avLst/>
+          </a:prstGeom>
+          <a:solidFill>
+            <a:schemeClr val="tx1"/>
+          </a:solidFill>
+        </p:spPr>
+        <p:style>
+          <a:lnRef idx="2">
+            <a:schemeClr val="accent1">
+              <a:shade val="50000"/>
+            </a:schemeClr>
+          </a:lnRef>
+          <a:fillRef idx="1">
+            <a:schemeClr val="accent1"/>
+          </a:fillRef>
+          <a:effectRef idx="0">
+            <a:schemeClr val="accent1"/>
+          </a:effectRef>
+          <a:fontRef idx="minor">
+            <a:schemeClr val="lt1"/>
+          </a:fontRef>
+        </p:style>
+        <p:txBody>
+          <a:bodyPr rtlCol="0" anchor="ctr"/>
+          <a:lstStyle/>
+          <a:p>
+            <a:pPr algn="ctr"/>
+            <a:endParaRPr lang="en-US" dirty="0">
+              <a:solidFill>
+                <a:srgbClr val="FF0000"/>
+              </a:solidFill>
+            </a:endParaRPr>
+          </a:p>
+        </p:txBody>
+      </p:sp>
+      <p:sp>
+        <p:nvSpPr>
+          <p:cNvPr id="7" name="Title 1"/>
+          <p:cNvSpPr txBox="1">
+            <a:spLocks/>
+          </p:cNvSpPr>
+          <p:nvPr/>
+        </p:nvSpPr>
+        <p:spPr>
+          <a:xfrm>
+            <a:off x="457200" y="274638"/>
+            <a:ext cx="8077200" cy="868362"/>
+          </a:xfrm>
+          <a:prstGeom prst="rect">
+            <a:avLst/>
+          </a:prstGeom>
+        </p:spPr>
+        <p:txBody>
+          <a:bodyPr vert="horz" lIns="91440" tIns="45720" rIns="91440" bIns="45720" rtlCol="0" anchor="ctr">
+            <a:normAutofit fontScale="67500" lnSpcReduction="20000"/>
+          </a:bodyPr>
+          <a:lstStyle/>
+          <a:p>
+            <a:pPr marL="0" marR="0" lvl="0" indent="0" algn="ctr" defTabSz="914400" rtl="0" eaLnBrk="1" fontAlgn="auto" latinLnBrk="0" hangingPunct="1">
+              <a:lnSpc>
+                <a:spcPct val="100000"/>
+              </a:lnSpc>
+              <a:spcBef>
+                <a:spcPct val="0"/>
+              </a:spcBef>
+              <a:spcAft>
+                <a:spcPts val="0"/>
+              </a:spcAft>
+              <a:buClrTx/>
+              <a:buSzTx/>
+              <a:buFontTx/>
+              <a:buNone/>
+              <a:tabLst/>
+              <a:defRPr/>
+            </a:pPr>
+            <a:r>
+              <a:rPr kumimoji="0" lang="en-US" sz="4400" b="0" i="0" u="none" strike="noStrike" kern="1200" cap="none" spc="0" normalizeH="0" baseline="0" noProof="0" dirty="0" err="1" smtClean="0">
+                <a:ln>
+                  <a:noFill/>
+                </a:ln>
+                <a:solidFill>
+                  <a:schemeClr val="bg1"/>
+                </a:solidFill>
+                <a:effectLst/>
+                <a:uLnTx/>
+                <a:uFillTx/>
+                <a:latin typeface="+mj-lt"/>
+                <a:ea typeface="+mj-ea"/>
+                <a:cs typeface="+mj-cs"/>
+              </a:rPr>
+              <a:t>Fitur-fitur</a:t>
+            </a:r>
+            <a:r>
+              <a:rPr kumimoji="0" lang="en-US" sz="4400" b="0" i="0" u="none" strike="noStrike" kern="1200" cap="none" spc="0" normalizeH="0" baseline="0" noProof="0" dirty="0" smtClean="0">
+                <a:ln>
+                  <a:noFill/>
+                </a:ln>
+                <a:solidFill>
+                  <a:schemeClr val="bg1"/>
+                </a:solidFill>
+                <a:effectLst/>
+                <a:uLnTx/>
+                <a:uFillTx/>
+                <a:latin typeface="+mj-lt"/>
+                <a:ea typeface="+mj-ea"/>
+                <a:cs typeface="+mj-cs"/>
+              </a:rPr>
+              <a:t> yang </a:t>
+            </a:r>
+            <a:r>
+              <a:rPr kumimoji="0" lang="en-US" sz="4400" b="0" i="0" u="none" strike="noStrike" kern="1200" cap="none" spc="0" normalizeH="0" baseline="0" noProof="0" dirty="0" err="1" smtClean="0">
+                <a:ln>
+                  <a:noFill/>
+                </a:ln>
+                <a:solidFill>
+                  <a:schemeClr val="bg1"/>
+                </a:solidFill>
+                <a:effectLst/>
+                <a:uLnTx/>
+                <a:uFillTx/>
+                <a:latin typeface="+mj-lt"/>
+                <a:ea typeface="+mj-ea"/>
+                <a:cs typeface="+mj-cs"/>
+              </a:rPr>
+              <a:t>terdapat</a:t>
+            </a:r>
+            <a:r>
+              <a:rPr kumimoji="0" lang="en-US" sz="4400" b="0" i="0" u="none" strike="noStrike" kern="1200" cap="none" spc="0" normalizeH="0" baseline="0" noProof="0" dirty="0" smtClean="0">
+                <a:ln>
+                  <a:noFill/>
+                </a:ln>
+                <a:solidFill>
+                  <a:schemeClr val="bg1"/>
+                </a:solidFill>
+                <a:effectLst/>
+                <a:uLnTx/>
+                <a:uFillTx/>
+                <a:latin typeface="+mj-lt"/>
+                <a:ea typeface="+mj-ea"/>
+                <a:cs typeface="+mj-cs"/>
+              </a:rPr>
+              <a:t> </a:t>
+            </a:r>
+            <a:r>
+              <a:rPr kumimoji="0" lang="en-US" sz="4400" b="0" i="0" u="none" strike="noStrike" kern="1200" cap="none" spc="0" normalizeH="0" baseline="0" noProof="0" dirty="0" err="1" smtClean="0">
+                <a:ln>
+                  <a:noFill/>
+                </a:ln>
+                <a:solidFill>
+                  <a:schemeClr val="bg1"/>
+                </a:solidFill>
+                <a:effectLst/>
+                <a:uLnTx/>
+                <a:uFillTx/>
+                <a:latin typeface="+mj-lt"/>
+                <a:ea typeface="+mj-ea"/>
+                <a:cs typeface="+mj-cs"/>
+              </a:rPr>
+              <a:t>pada</a:t>
+            </a:r>
+            <a:r>
+              <a:rPr kumimoji="0" lang="en-US" sz="4400" b="0" i="0" u="none" strike="noStrike" kern="1200" cap="none" spc="0" normalizeH="0" baseline="0" noProof="0" dirty="0" smtClean="0">
+                <a:ln>
+                  <a:noFill/>
+                </a:ln>
+                <a:solidFill>
+                  <a:schemeClr val="bg1"/>
+                </a:solidFill>
+                <a:effectLst/>
+                <a:uLnTx/>
+                <a:uFillTx/>
+                <a:latin typeface="+mj-lt"/>
+                <a:ea typeface="+mj-ea"/>
+                <a:cs typeface="+mj-cs"/>
+              </a:rPr>
+              <a:t> Batman’s Challenge</a:t>
+            </a:r>
+            <a:endParaRPr kumimoji="0" lang="en-US" sz="4400" b="0" i="0" u="none" strike="noStrike" kern="1200" cap="none" spc="0" normalizeH="0" baseline="0" noProof="0" dirty="0">
+              <a:ln>
+                <a:noFill/>
+              </a:ln>
+              <a:solidFill>
+                <a:schemeClr val="bg1"/>
+              </a:solidFill>
+              <a:effectLst/>
+              <a:uLnTx/>
+              <a:uFillTx/>
+              <a:latin typeface="+mj-lt"/>
+              <a:ea typeface="+mj-ea"/>
+              <a:cs typeface="+mj-cs"/>
+            </a:endParaRPr>
+          </a:p>
+        </p:txBody>
+      </p:sp>
+      <p:sp>
+        <p:nvSpPr>
+          <p:cNvPr id="3" name="Content Placeholder 2"/>
+          <p:cNvSpPr>
+            <a:spLocks noGrp="1"/>
+          </p:cNvSpPr>
+          <p:nvPr>
+            <p:ph sz="half" idx="1"/>
+          </p:nvPr>
+        </p:nvSpPr>
+        <p:spPr/>
+        <p:txBody>
+          <a:bodyPr/>
+          <a:lstStyle/>
+          <a:p>
+            <a:endParaRPr lang="en-US" dirty="0" smtClean="0">
+              <a:solidFill>
+                <a:schemeClr val="bg1"/>
+              </a:solidFill>
+            </a:endParaRPr>
+          </a:p>
+          <a:p>
+            <a:endParaRPr lang="en-US" dirty="0" smtClean="0">
+              <a:solidFill>
+                <a:schemeClr val="bg1"/>
+              </a:solidFill>
+            </a:endParaRPr>
+          </a:p>
+          <a:p>
+            <a:r>
+              <a:rPr lang="en-US" dirty="0" smtClean="0">
+                <a:solidFill>
+                  <a:schemeClr val="bg1"/>
+                </a:solidFill>
+              </a:rPr>
+              <a:t>Level</a:t>
+            </a:r>
+          </a:p>
+          <a:p>
+            <a:endParaRPr lang="en-US" dirty="0" smtClean="0">
+              <a:solidFill>
+                <a:schemeClr val="bg1"/>
+              </a:solidFill>
+            </a:endParaRPr>
+          </a:p>
+          <a:p>
+            <a:r>
+              <a:rPr lang="en-US" dirty="0" err="1" smtClean="0">
+                <a:solidFill>
+                  <a:schemeClr val="bg1"/>
+                </a:solidFill>
+              </a:rPr>
+              <a:t>Pilih</a:t>
+            </a:r>
+            <a:r>
+              <a:rPr lang="en-US" dirty="0" smtClean="0">
+                <a:solidFill>
+                  <a:schemeClr val="bg1"/>
+                </a:solidFill>
+              </a:rPr>
+              <a:t> </a:t>
+            </a:r>
+            <a:r>
+              <a:rPr lang="en-US" dirty="0" err="1" smtClean="0">
+                <a:solidFill>
+                  <a:schemeClr val="bg1"/>
+                </a:solidFill>
+              </a:rPr>
+              <a:t>Karakter</a:t>
+            </a:r>
+            <a:endParaRPr lang="en-US" dirty="0" smtClean="0">
+              <a:solidFill>
+                <a:schemeClr val="bg1"/>
+              </a:solidFill>
+            </a:endParaRPr>
+          </a:p>
+          <a:p>
+            <a:endParaRPr lang="en-US" dirty="0" smtClean="0">
+              <a:solidFill>
+                <a:schemeClr val="bg1"/>
+              </a:solidFill>
+            </a:endParaRPr>
+          </a:p>
+          <a:p>
+            <a:r>
+              <a:rPr lang="en-US" dirty="0" smtClean="0">
+                <a:solidFill>
+                  <a:schemeClr val="bg1"/>
+                </a:solidFill>
+              </a:rPr>
+              <a:t>IC Left</a:t>
+            </a:r>
+            <a:endParaRPr lang="en-US" dirty="0">
+              <a:solidFill>
+                <a:schemeClr val="bg1"/>
+              </a:solidFill>
+            </a:endParaRPr>
+          </a:p>
+        </p:txBody>
+      </p:sp>
+      <p:sp>
+        <p:nvSpPr>
+          <p:cNvPr id="10" name="Rounded Rectangle 9"/>
+          <p:cNvSpPr/>
+          <p:nvPr/>
+        </p:nvSpPr>
+        <p:spPr>
+          <a:xfrm>
+            <a:off x="4876800" y="1676400"/>
+            <a:ext cx="3581400" cy="4572000"/>
+          </a:xfrm>
+          <a:prstGeom prst="roundRect">
+            <a:avLst/>
+          </a:prstGeom>
+          <a:solidFill>
+            <a:schemeClr val="tx1"/>
+          </a:solidFill>
+        </p:spPr>
+        <p:style>
+          <a:lnRef idx="2">
+            <a:schemeClr val="accent1">
+              <a:shade val="50000"/>
+            </a:schemeClr>
+          </a:lnRef>
+          <a:fillRef idx="1">
+            <a:schemeClr val="accent1"/>
+          </a:fillRef>
+          <a:effectRef idx="0">
+            <a:schemeClr val="accent1"/>
+          </a:effectRef>
+          <a:fontRef idx="minor">
+            <a:schemeClr val="lt1"/>
+          </a:fontRef>
+        </p:style>
+        <p:txBody>
+          <a:bodyPr rtlCol="0" anchor="ctr"/>
+          <a:lstStyle/>
+          <a:p>
+            <a:pPr algn="ctr"/>
+            <a:endParaRPr lang="en-US"/>
+          </a:p>
+        </p:txBody>
+      </p:sp>
+      <p:pic>
+        <p:nvPicPr>
+          <p:cNvPr id="3074" name="Picture 2" descr="D:\TA ADBO CHIP\Slide Image\Fitur kanan.jpg"/>
+          <p:cNvPicPr>
+            <a:picLocks noChangeAspect="1" noChangeArrowheads="1"/>
+          </p:cNvPicPr>
+          <p:nvPr/>
+        </p:nvPicPr>
+        <p:blipFill>
+          <a:blip r:embed="rId3"/>
+          <a:srcRect/>
+          <a:stretch>
+            <a:fillRect/>
+          </a:stretch>
+        </p:blipFill>
+        <p:spPr bwMode="auto">
+          <a:xfrm>
+            <a:off x="5105400" y="1905000"/>
+            <a:ext cx="3048000" cy="4030579"/>
+          </a:xfrm>
+          <a:prstGeom prst="rect">
+            <a:avLst/>
+          </a:prstGeom>
+          <a:noFill/>
         </p:spPr>
       </p:pic>
     </p:spTree>
@@ -4176,6 +5572,30 @@
           <a:chExt cx="0" cy="0"/>
         </a:xfrm>
       </p:grpSpPr>
+      <p:pic>
+        <p:nvPicPr>
+          <p:cNvPr id="4" name="Picture 3" descr="Gotham.jpg"/>
+          <p:cNvPicPr>
+            <a:picLocks noChangeAspect="1"/>
+          </p:cNvPicPr>
+          <p:nvPr/>
+        </p:nvPicPr>
+        <p:blipFill>
+          <a:blip r:embed="rId2"/>
+          <a:stretch>
+            <a:fillRect/>
+          </a:stretch>
+        </p:blipFill>
+        <p:spPr>
+          <a:xfrm>
+            <a:off x="0" y="0"/>
+            <a:ext cx="9144000" cy="6858000"/>
+          </a:xfrm>
+          <a:prstGeom prst="rect">
+            <a:avLst/>
+          </a:prstGeom>
+        </p:spPr>
+      </p:pic>
       <p:sp>
         <p:nvSpPr>
           <p:cNvPr id="2" name="Title 1"/>
@@ -4191,11 +5611,1133 @@
           <a:bodyPr/>
           <a:lstStyle/>
           <a:p>
-            <a:r>
-              <a:rPr lang="en-US" dirty="0" smtClean="0"/>
-              <a:t>Demo</a:t>
-            </a:r>
             <a:endParaRPr lang="en-US" dirty="0"/>
+          </a:p>
+        </p:txBody>
+      </p:sp>
+      <p:sp>
+        <p:nvSpPr>
+          <p:cNvPr id="3" name="Content Placeholder 2"/>
+          <p:cNvSpPr>
+            <a:spLocks noGrp="1"/>
+          </p:cNvSpPr>
+          <p:nvPr>
+            <p:ph idx="1"/>
+          </p:nvPr>
+        </p:nvSpPr>
+        <p:spPr/>
+        <p:txBody>
+          <a:bodyPr/>
+          <a:lstStyle/>
+          <a:p>
+            <a:endParaRPr lang="en-US"/>
+          </a:p>
+        </p:txBody>
+      </p:sp>
+      <p:sp>
+        <p:nvSpPr>
+          <p:cNvPr id="5" name="Rounded Rectangle 4"/>
+          <p:cNvSpPr/>
+          <p:nvPr/>
+        </p:nvSpPr>
+        <p:spPr>
+          <a:xfrm>
+            <a:off x="304800" y="152400"/>
+            <a:ext cx="8534400" cy="1143000"/>
+          </a:xfrm>
+          <a:prstGeom prst="roundRect">
+            <a:avLst/>
+          </a:prstGeom>
+          <a:solidFill>
+            <a:schemeClr val="tx1"/>
+          </a:solidFill>
+        </p:spPr>
+        <p:style>
+          <a:lnRef idx="2">
+            <a:schemeClr val="accent1">
+              <a:shade val="50000"/>
+            </a:schemeClr>
+          </a:lnRef>
+          <a:fillRef idx="1">
+            <a:schemeClr val="accent1"/>
+          </a:fillRef>
+          <a:effectRef idx="0">
+            <a:schemeClr val="accent1"/>
+          </a:effectRef>
+          <a:fontRef idx="minor">
+            <a:schemeClr val="lt1"/>
+          </a:fontRef>
+        </p:style>
+        <p:txBody>
+          <a:bodyPr rtlCol="0" anchor="ctr"/>
+          <a:lstStyle/>
+          <a:p>
+            <a:pPr algn="ctr"/>
+            <a:endParaRPr lang="en-US" dirty="0">
+              <a:solidFill>
+                <a:srgbClr val="FF0000"/>
+              </a:solidFill>
+            </a:endParaRPr>
+          </a:p>
+        </p:txBody>
+      </p:sp>
+      <p:sp>
+        <p:nvSpPr>
+          <p:cNvPr id="6" name="Title 1"/>
+          <p:cNvSpPr txBox="1">
+            <a:spLocks/>
+          </p:cNvSpPr>
+          <p:nvPr/>
+        </p:nvSpPr>
+        <p:spPr>
+          <a:xfrm>
+            <a:off x="457200" y="274638"/>
+            <a:ext cx="8077200" cy="868362"/>
+          </a:xfrm>
+          <a:prstGeom prst="rect">
+            <a:avLst/>
+          </a:prstGeom>
+        </p:spPr>
+        <p:txBody>
+          <a:bodyPr vert="horz" lIns="91440" tIns="45720" rIns="91440" bIns="45720" rtlCol="0" anchor="ctr">
+            <a:normAutofit fontScale="97500"/>
+          </a:bodyPr>
+          <a:lstStyle/>
+          <a:p>
+            <a:pPr marL="0" marR="0" lvl="0" indent="0" algn="ctr" defTabSz="914400" rtl="0" eaLnBrk="1" fontAlgn="auto" latinLnBrk="0" hangingPunct="1">
+              <a:lnSpc>
+                <a:spcPct val="100000"/>
+              </a:lnSpc>
+              <a:spcBef>
+                <a:spcPct val="0"/>
+              </a:spcBef>
+              <a:spcAft>
+                <a:spcPts val="0"/>
+              </a:spcAft>
+              <a:buClrTx/>
+              <a:buSzTx/>
+              <a:buFontTx/>
+              <a:buNone/>
+              <a:tabLst/>
+              <a:defRPr/>
+            </a:pPr>
+            <a:r>
+              <a:rPr lang="en-US" sz="4400" dirty="0" smtClean="0">
+                <a:solidFill>
+                  <a:schemeClr val="bg1"/>
+                </a:solidFill>
+                <a:latin typeface="+mj-lt"/>
+                <a:ea typeface="+mj-ea"/>
+                <a:cs typeface="+mj-cs"/>
+              </a:rPr>
+              <a:t>Map Level</a:t>
+            </a:r>
+            <a:endParaRPr kumimoji="0" lang="en-US" sz="4400" b="0" i="0" u="none" strike="noStrike" kern="1200" cap="none" spc="0" normalizeH="0" baseline="0" noProof="0" dirty="0">
+              <a:ln>
+                <a:noFill/>
+              </a:ln>
+              <a:solidFill>
+                <a:schemeClr val="bg1"/>
+              </a:solidFill>
+              <a:effectLst/>
+              <a:uLnTx/>
+              <a:uFillTx/>
+              <a:latin typeface="+mj-lt"/>
+              <a:ea typeface="+mj-ea"/>
+              <a:cs typeface="+mj-cs"/>
+            </a:endParaRPr>
+          </a:p>
+        </p:txBody>
+      </p:sp>
+      <p:pic>
+        <p:nvPicPr>
+          <p:cNvPr id="7" name="Picture 6" descr="level1.jpg"/>
+          <p:cNvPicPr/>
+          <p:nvPr/>
+        </p:nvPicPr>
+        <p:blipFill>
+          <a:blip r:embed="rId3"/>
+          <a:stretch>
+            <a:fillRect/>
+          </a:stretch>
+        </p:blipFill>
+        <p:spPr>
+          <a:xfrm>
+            <a:off x="457200" y="1600200"/>
+            <a:ext cx="3381375" cy="2162850"/>
+          </a:xfrm>
+          <a:prstGeom prst="rect">
+            <a:avLst/>
+          </a:prstGeom>
+        </p:spPr>
+      </p:pic>
+      <p:pic>
+        <p:nvPicPr>
+          <p:cNvPr id="8" name="Picture 7" descr="level2.jpg"/>
+          <p:cNvPicPr/>
+          <p:nvPr/>
+        </p:nvPicPr>
+        <p:blipFill>
+          <a:blip r:embed="rId4"/>
+          <a:stretch>
+            <a:fillRect/>
+          </a:stretch>
+        </p:blipFill>
+        <p:spPr>
+          <a:xfrm>
+            <a:off x="5257800" y="1600200"/>
+            <a:ext cx="3448050" cy="2213236"/>
+          </a:xfrm>
+          <a:prstGeom prst="rect">
+            <a:avLst/>
+          </a:prstGeom>
+        </p:spPr>
+      </p:pic>
+      <p:pic>
+        <p:nvPicPr>
+          <p:cNvPr id="9" name="Picture 8" descr="level3.jpg"/>
+          <p:cNvPicPr/>
+          <p:nvPr/>
+        </p:nvPicPr>
+        <p:blipFill>
+          <a:blip r:embed="rId5"/>
+          <a:stretch>
+            <a:fillRect/>
+          </a:stretch>
+        </p:blipFill>
+        <p:spPr>
+          <a:xfrm>
+            <a:off x="457201" y="3886200"/>
+            <a:ext cx="3352800" cy="2304945"/>
+          </a:xfrm>
+          <a:prstGeom prst="rect">
+            <a:avLst/>
+          </a:prstGeom>
+        </p:spPr>
+      </p:pic>
+      <p:pic>
+        <p:nvPicPr>
+          <p:cNvPr id="10" name="Picture 9" descr="level4.jpg"/>
+          <p:cNvPicPr/>
+          <p:nvPr/>
+        </p:nvPicPr>
+        <p:blipFill>
+          <a:blip r:embed="rId6"/>
+          <a:stretch>
+            <a:fillRect/>
+          </a:stretch>
+        </p:blipFill>
+        <p:spPr>
+          <a:xfrm>
+            <a:off x="5257800" y="3962400"/>
+            <a:ext cx="3429000" cy="2182447"/>
+          </a:xfrm>
+          <a:prstGeom prst="rect">
+            <a:avLst/>
+          </a:prstGeom>
+        </p:spPr>
+      </p:pic>
+      <p:pic>
+        <p:nvPicPr>
+          <p:cNvPr id="12" name="Picture 11" descr="level5.jpg"/>
+          <p:cNvPicPr/>
+          <p:nvPr/>
+        </p:nvPicPr>
+        <p:blipFill>
+          <a:blip r:embed="rId7"/>
+          <a:stretch>
+            <a:fillRect/>
+          </a:stretch>
+        </p:blipFill>
+        <p:spPr>
+          <a:xfrm>
+            <a:off x="2769935" y="2271712"/>
+            <a:ext cx="3604130" cy="2314575"/>
+          </a:xfrm>
+          <a:prstGeom prst="rect">
+            <a:avLst/>
+          </a:prstGeom>
+        </p:spPr>
+      </p:pic>
+    </p:spTree>
+  </p:cSld>
+  <p:clrMapOvr>
+    <a:masterClrMapping/>
+  </p:clrMapOvr>
+  <p:timing>
+    <p:tnLst>
+      <p:par>
+        <p:cTn id="1" dur="indefinite" restart="never" nodeType="tmRoot"/>
+      </p:par>
+    </p:tnLst>
+  </p:timing>
+</p:sld>
+</file>
+
+<file path=ppt/slides/slide6.xml><?xml version="1.0" encoding="utf-8"?>
+<p:sld xmlns:a="http://schemas.openxmlformats.org/drawingml/2006/main" xmlns:r="http://schemas.openxmlformats.org/officeDocument/2006/relationships" xmlns:p="http://schemas.openxmlformats.org/presentationml/2006/main">
+  <p:cSld>
+    <p:spTree>
+      <p:nvGrpSpPr>
+        <p:cNvPr id="1" name=""/>
+        <p:cNvGrpSpPr/>
+        <p:nvPr/>
+      </p:nvGrpSpPr>
+      <p:grpSpPr>
+        <a:xfrm>
+          <a:off x="0" y="0"/>
+          <a:ext cx="0" cy="0"/>
+          <a:chOff x="0" y="0"/>
+          <a:chExt cx="0" cy="0"/>
+        </a:xfrm>
+      </p:grpSpPr>
+      <p:pic>
+        <p:nvPicPr>
+          <p:cNvPr id="5" name="Picture 4" descr="Gotham.jpg"/>
+          <p:cNvPicPr>
+            <a:picLocks noChangeAspect="1"/>
+          </p:cNvPicPr>
+          <p:nvPr/>
+        </p:nvPicPr>
+        <p:blipFill>
+          <a:blip r:embed="rId2"/>
+          <a:stretch>
+            <a:fillRect/>
+          </a:stretch>
+        </p:blipFill>
+        <p:spPr>
+          <a:xfrm>
+            <a:off x="0" y="0"/>
+            <a:ext cx="9144000" cy="6858000"/>
+          </a:xfrm>
+          <a:prstGeom prst="rect">
+            <a:avLst/>
+          </a:prstGeom>
+        </p:spPr>
+      </p:pic>
+      <p:sp>
+        <p:nvSpPr>
+          <p:cNvPr id="2" name="Title 1"/>
+          <p:cNvSpPr>
+            <a:spLocks noGrp="1"/>
+          </p:cNvSpPr>
+          <p:nvPr>
+            <p:ph type="title"/>
+          </p:nvPr>
+        </p:nvSpPr>
+        <p:spPr/>
+        <p:txBody>
+          <a:bodyPr/>
+          <a:lstStyle/>
+          <a:p>
+            <a:endParaRPr lang="en-US"/>
+          </a:p>
+        </p:txBody>
+      </p:sp>
+      <p:pic>
+        <p:nvPicPr>
+          <p:cNvPr id="8" name="Content Placeholder 7" descr="Fitur Burn.jpg"/>
+          <p:cNvPicPr>
+            <a:picLocks noGrp="1" noChangeAspect="1"/>
+          </p:cNvPicPr>
+          <p:nvPr>
+            <p:ph sz="half" idx="1"/>
+          </p:nvPr>
+        </p:nvPicPr>
+        <p:blipFill>
+          <a:blip r:embed="rId3"/>
+          <a:stretch>
+            <a:fillRect/>
+          </a:stretch>
+        </p:blipFill>
+        <p:spPr>
+          <a:xfrm>
+            <a:off x="5029200" y="1600200"/>
+            <a:ext cx="3681704" cy="2358216"/>
+          </a:xfrm>
+        </p:spPr>
+      </p:pic>
+      <p:sp>
+        <p:nvSpPr>
+          <p:cNvPr id="6" name="Rounded Rectangle 5"/>
+          <p:cNvSpPr/>
+          <p:nvPr/>
+        </p:nvSpPr>
+        <p:spPr>
+          <a:xfrm>
+            <a:off x="304800" y="152400"/>
+            <a:ext cx="8534400" cy="1143000"/>
+          </a:xfrm>
+          <a:prstGeom prst="roundRect">
+            <a:avLst/>
+          </a:prstGeom>
+          <a:solidFill>
+            <a:schemeClr val="tx1"/>
+          </a:solidFill>
+        </p:spPr>
+        <p:style>
+          <a:lnRef idx="2">
+            <a:schemeClr val="accent1">
+              <a:shade val="50000"/>
+            </a:schemeClr>
+          </a:lnRef>
+          <a:fillRef idx="1">
+            <a:schemeClr val="accent1"/>
+          </a:fillRef>
+          <a:effectRef idx="0">
+            <a:schemeClr val="accent1"/>
+          </a:effectRef>
+          <a:fontRef idx="minor">
+            <a:schemeClr val="lt1"/>
+          </a:fontRef>
+        </p:style>
+        <p:txBody>
+          <a:bodyPr rtlCol="0" anchor="ctr"/>
+          <a:lstStyle/>
+          <a:p>
+            <a:pPr algn="ctr"/>
+            <a:endParaRPr lang="en-US" dirty="0">
+              <a:solidFill>
+                <a:srgbClr val="FF0000"/>
+              </a:solidFill>
+            </a:endParaRPr>
+          </a:p>
+        </p:txBody>
+      </p:sp>
+      <p:sp>
+        <p:nvSpPr>
+          <p:cNvPr id="7" name="Title 1"/>
+          <p:cNvSpPr txBox="1">
+            <a:spLocks/>
+          </p:cNvSpPr>
+          <p:nvPr/>
+        </p:nvSpPr>
+        <p:spPr>
+          <a:xfrm>
+            <a:off x="457200" y="274638"/>
+            <a:ext cx="8077200" cy="868362"/>
+          </a:xfrm>
+          <a:prstGeom prst="rect">
+            <a:avLst/>
+          </a:prstGeom>
+        </p:spPr>
+        <p:txBody>
+          <a:bodyPr vert="horz" lIns="91440" tIns="45720" rIns="91440" bIns="45720" rtlCol="0" anchor="ctr">
+            <a:normAutofit fontScale="67500" lnSpcReduction="20000"/>
+          </a:bodyPr>
+          <a:lstStyle/>
+          <a:p>
+            <a:pPr marL="0" marR="0" lvl="0" indent="0" algn="ctr" defTabSz="914400" rtl="0" eaLnBrk="1" fontAlgn="auto" latinLnBrk="0" hangingPunct="1">
+              <a:lnSpc>
+                <a:spcPct val="100000"/>
+              </a:lnSpc>
+              <a:spcBef>
+                <a:spcPct val="0"/>
+              </a:spcBef>
+              <a:spcAft>
+                <a:spcPts val="0"/>
+              </a:spcAft>
+              <a:buClrTx/>
+              <a:buSzTx/>
+              <a:buFontTx/>
+              <a:buNone/>
+              <a:tabLst/>
+              <a:defRPr/>
+            </a:pPr>
+            <a:r>
+              <a:rPr kumimoji="0" lang="en-US" sz="4400" b="0" i="0" u="none" strike="noStrike" kern="1200" cap="none" spc="0" normalizeH="0" baseline="0" noProof="0" dirty="0" err="1" smtClean="0">
+                <a:ln>
+                  <a:noFill/>
+                </a:ln>
+                <a:solidFill>
+                  <a:schemeClr val="bg1"/>
+                </a:solidFill>
+                <a:effectLst/>
+                <a:uLnTx/>
+                <a:uFillTx/>
+                <a:latin typeface="+mj-lt"/>
+                <a:ea typeface="+mj-ea"/>
+                <a:cs typeface="+mj-cs"/>
+              </a:rPr>
+              <a:t>Fitur-fitur</a:t>
+            </a:r>
+            <a:r>
+              <a:rPr kumimoji="0" lang="en-US" sz="4400" b="0" i="0" u="none" strike="noStrike" kern="1200" cap="none" spc="0" normalizeH="0" baseline="0" noProof="0" dirty="0" smtClean="0">
+                <a:ln>
+                  <a:noFill/>
+                </a:ln>
+                <a:solidFill>
+                  <a:schemeClr val="bg1"/>
+                </a:solidFill>
+                <a:effectLst/>
+                <a:uLnTx/>
+                <a:uFillTx/>
+                <a:latin typeface="+mj-lt"/>
+                <a:ea typeface="+mj-ea"/>
+                <a:cs typeface="+mj-cs"/>
+              </a:rPr>
+              <a:t> yang </a:t>
+            </a:r>
+            <a:r>
+              <a:rPr kumimoji="0" lang="en-US" sz="4400" b="0" i="0" u="none" strike="noStrike" kern="1200" cap="none" spc="0" normalizeH="0" baseline="0" noProof="0" dirty="0" err="1" smtClean="0">
+                <a:ln>
+                  <a:noFill/>
+                </a:ln>
+                <a:solidFill>
+                  <a:schemeClr val="bg1"/>
+                </a:solidFill>
+                <a:effectLst/>
+                <a:uLnTx/>
+                <a:uFillTx/>
+                <a:latin typeface="+mj-lt"/>
+                <a:ea typeface="+mj-ea"/>
+                <a:cs typeface="+mj-cs"/>
+              </a:rPr>
+              <a:t>terdapat</a:t>
+            </a:r>
+            <a:r>
+              <a:rPr kumimoji="0" lang="en-US" sz="4400" b="0" i="0" u="none" strike="noStrike" kern="1200" cap="none" spc="0" normalizeH="0" baseline="0" noProof="0" dirty="0" smtClean="0">
+                <a:ln>
+                  <a:noFill/>
+                </a:ln>
+                <a:solidFill>
+                  <a:schemeClr val="bg1"/>
+                </a:solidFill>
+                <a:effectLst/>
+                <a:uLnTx/>
+                <a:uFillTx/>
+                <a:latin typeface="+mj-lt"/>
+                <a:ea typeface="+mj-ea"/>
+                <a:cs typeface="+mj-cs"/>
+              </a:rPr>
+              <a:t> </a:t>
+            </a:r>
+            <a:r>
+              <a:rPr kumimoji="0" lang="en-US" sz="4400" b="0" i="0" u="none" strike="noStrike" kern="1200" cap="none" spc="0" normalizeH="0" baseline="0" noProof="0" dirty="0" err="1" smtClean="0">
+                <a:ln>
+                  <a:noFill/>
+                </a:ln>
+                <a:solidFill>
+                  <a:schemeClr val="bg1"/>
+                </a:solidFill>
+                <a:effectLst/>
+                <a:uLnTx/>
+                <a:uFillTx/>
+                <a:latin typeface="+mj-lt"/>
+                <a:ea typeface="+mj-ea"/>
+                <a:cs typeface="+mj-cs"/>
+              </a:rPr>
+              <a:t>pada</a:t>
+            </a:r>
+            <a:r>
+              <a:rPr kumimoji="0" lang="en-US" sz="4400" b="0" i="0" u="none" strike="noStrike" kern="1200" cap="none" spc="0" normalizeH="0" baseline="0" noProof="0" dirty="0" smtClean="0">
+                <a:ln>
+                  <a:noFill/>
+                </a:ln>
+                <a:solidFill>
+                  <a:schemeClr val="bg1"/>
+                </a:solidFill>
+                <a:effectLst/>
+                <a:uLnTx/>
+                <a:uFillTx/>
+                <a:latin typeface="+mj-lt"/>
+                <a:ea typeface="+mj-ea"/>
+                <a:cs typeface="+mj-cs"/>
+              </a:rPr>
+              <a:t> Batman’s Challenge(Cont..)</a:t>
+            </a:r>
+            <a:endParaRPr kumimoji="0" lang="en-US" sz="4400" b="0" i="0" u="none" strike="noStrike" kern="1200" cap="none" spc="0" normalizeH="0" baseline="0" noProof="0" dirty="0">
+              <a:ln>
+                <a:noFill/>
+              </a:ln>
+              <a:solidFill>
+                <a:schemeClr val="bg1"/>
+              </a:solidFill>
+              <a:effectLst/>
+              <a:uLnTx/>
+              <a:uFillTx/>
+              <a:latin typeface="+mj-lt"/>
+              <a:ea typeface="+mj-ea"/>
+              <a:cs typeface="+mj-cs"/>
+            </a:endParaRPr>
+          </a:p>
+        </p:txBody>
+      </p:sp>
+      <p:pic>
+        <p:nvPicPr>
+          <p:cNvPr id="9" name="Picture 8" descr="Fitur Sinking.jpg"/>
+          <p:cNvPicPr>
+            <a:picLocks noChangeAspect="1"/>
+          </p:cNvPicPr>
+          <p:nvPr/>
+        </p:nvPicPr>
+        <p:blipFill>
+          <a:blip r:embed="rId4"/>
+          <a:stretch>
+            <a:fillRect/>
+          </a:stretch>
+        </p:blipFill>
+        <p:spPr>
+          <a:xfrm>
+            <a:off x="5029200" y="4191000"/>
+            <a:ext cx="3657600" cy="2309551"/>
+          </a:xfrm>
+          <a:prstGeom prst="rect">
+            <a:avLst/>
+          </a:prstGeom>
+        </p:spPr>
+      </p:pic>
+      <p:sp>
+        <p:nvSpPr>
+          <p:cNvPr id="11" name="Rounded Rectangle 10"/>
+          <p:cNvSpPr/>
+          <p:nvPr/>
+        </p:nvSpPr>
+        <p:spPr>
+          <a:xfrm>
+            <a:off x="762000" y="3733800"/>
+            <a:ext cx="2133600" cy="533400"/>
+          </a:xfrm>
+          <a:prstGeom prst="roundRect">
+            <a:avLst/>
+          </a:prstGeom>
+          <a:solidFill>
+            <a:schemeClr val="tx1"/>
+          </a:solidFill>
+        </p:spPr>
+        <p:style>
+          <a:lnRef idx="2">
+            <a:schemeClr val="accent1">
+              <a:shade val="50000"/>
+            </a:schemeClr>
+          </a:lnRef>
+          <a:fillRef idx="1">
+            <a:schemeClr val="accent1"/>
+          </a:fillRef>
+          <a:effectRef idx="0">
+            <a:schemeClr val="accent1"/>
+          </a:effectRef>
+          <a:fontRef idx="minor">
+            <a:schemeClr val="lt1"/>
+          </a:fontRef>
+        </p:style>
+        <p:txBody>
+          <a:bodyPr rtlCol="0" anchor="ctr"/>
+          <a:lstStyle/>
+          <a:p>
+            <a:pPr algn="ctr"/>
+            <a:r>
+              <a:rPr lang="en-US" b="1" dirty="0" smtClean="0"/>
+              <a:t>LOSE</a:t>
+            </a:r>
+            <a:endParaRPr lang="en-US" b="1" dirty="0"/>
+          </a:p>
+        </p:txBody>
+      </p:sp>
+    </p:spTree>
+  </p:cSld>
+  <p:clrMapOvr>
+    <a:masterClrMapping/>
+  </p:clrMapOvr>
+  <p:timing>
+    <p:tnLst>
+      <p:par>
+        <p:cTn id="1" dur="indefinite" restart="never" nodeType="tmRoot"/>
+      </p:par>
+    </p:tnLst>
+  </p:timing>
+</p:sld>
+</file>
+
+<file path=ppt/slides/slide7.xml><?xml version="1.0" encoding="utf-8"?>
+<p:sld xmlns:a="http://schemas.openxmlformats.org/drawingml/2006/main" xmlns:r="http://schemas.openxmlformats.org/officeDocument/2006/relationships" xmlns:p="http://schemas.openxmlformats.org/presentationml/2006/main">
+  <p:cSld>
+    <p:spTree>
+      <p:nvGrpSpPr>
+        <p:cNvPr id="1" name=""/>
+        <p:cNvGrpSpPr/>
+        <p:nvPr/>
+      </p:nvGrpSpPr>
+      <p:grpSpPr>
+        <a:xfrm>
+          <a:off x="0" y="0"/>
+          <a:ext cx="0" cy="0"/>
+          <a:chOff x="0" y="0"/>
+          <a:chExt cx="0" cy="0"/>
+        </a:xfrm>
+      </p:grpSpPr>
+      <p:pic>
+        <p:nvPicPr>
+          <p:cNvPr id="5" name="Picture 4" descr="Gotham.jpg"/>
+          <p:cNvPicPr>
+            <a:picLocks noChangeAspect="1"/>
+          </p:cNvPicPr>
+          <p:nvPr/>
+        </p:nvPicPr>
+        <p:blipFill>
+          <a:blip r:embed="rId2"/>
+          <a:stretch>
+            <a:fillRect/>
+          </a:stretch>
+        </p:blipFill>
+        <p:spPr>
+          <a:xfrm>
+            <a:off x="0" y="0"/>
+            <a:ext cx="9144000" cy="6858000"/>
+          </a:xfrm>
+          <a:prstGeom prst="rect">
+            <a:avLst/>
+          </a:prstGeom>
+        </p:spPr>
+      </p:pic>
+      <p:sp>
+        <p:nvSpPr>
+          <p:cNvPr id="2" name="Title 1"/>
+          <p:cNvSpPr>
+            <a:spLocks noGrp="1"/>
+          </p:cNvSpPr>
+          <p:nvPr>
+            <p:ph type="title"/>
+          </p:nvPr>
+        </p:nvSpPr>
+        <p:spPr/>
+        <p:txBody>
+          <a:bodyPr/>
+          <a:lstStyle/>
+          <a:p>
+            <a:endParaRPr lang="en-US"/>
+          </a:p>
+        </p:txBody>
+      </p:sp>
+      <p:sp>
+        <p:nvSpPr>
+          <p:cNvPr id="6" name="Rounded Rectangle 5"/>
+          <p:cNvSpPr/>
+          <p:nvPr/>
+        </p:nvSpPr>
+        <p:spPr>
+          <a:xfrm>
+            <a:off x="304800" y="152400"/>
+            <a:ext cx="8534400" cy="1143000"/>
+          </a:xfrm>
+          <a:prstGeom prst="roundRect">
+            <a:avLst/>
+          </a:prstGeom>
+          <a:solidFill>
+            <a:schemeClr val="tx1"/>
+          </a:solidFill>
+        </p:spPr>
+        <p:style>
+          <a:lnRef idx="2">
+            <a:schemeClr val="accent1">
+              <a:shade val="50000"/>
+            </a:schemeClr>
+          </a:lnRef>
+          <a:fillRef idx="1">
+            <a:schemeClr val="accent1"/>
+          </a:fillRef>
+          <a:effectRef idx="0">
+            <a:schemeClr val="accent1"/>
+          </a:effectRef>
+          <a:fontRef idx="minor">
+            <a:schemeClr val="lt1"/>
+          </a:fontRef>
+        </p:style>
+        <p:txBody>
+          <a:bodyPr rtlCol="0" anchor="ctr"/>
+          <a:lstStyle/>
+          <a:p>
+            <a:pPr algn="ctr"/>
+            <a:endParaRPr lang="en-US" dirty="0">
+              <a:solidFill>
+                <a:srgbClr val="FF0000"/>
+              </a:solidFill>
+            </a:endParaRPr>
+          </a:p>
+        </p:txBody>
+      </p:sp>
+      <p:sp>
+        <p:nvSpPr>
+          <p:cNvPr id="7" name="Title 1"/>
+          <p:cNvSpPr txBox="1">
+            <a:spLocks/>
+          </p:cNvSpPr>
+          <p:nvPr/>
+        </p:nvSpPr>
+        <p:spPr>
+          <a:xfrm>
+            <a:off x="457200" y="274638"/>
+            <a:ext cx="8077200" cy="868362"/>
+          </a:xfrm>
+          <a:prstGeom prst="rect">
+            <a:avLst/>
+          </a:prstGeom>
+        </p:spPr>
+        <p:txBody>
+          <a:bodyPr vert="horz" lIns="91440" tIns="45720" rIns="91440" bIns="45720" rtlCol="0" anchor="ctr">
+            <a:normAutofit fontScale="67500" lnSpcReduction="20000"/>
+          </a:bodyPr>
+          <a:lstStyle/>
+          <a:p>
+            <a:pPr lvl="0" algn="ctr">
+              <a:spcBef>
+                <a:spcPct val="0"/>
+              </a:spcBef>
+            </a:pPr>
+            <a:r>
+              <a:rPr kumimoji="0" lang="en-US" sz="4400" b="0" i="0" u="none" strike="noStrike" kern="1200" cap="none" spc="0" normalizeH="0" baseline="0" noProof="0" dirty="0" err="1" smtClean="0">
+                <a:ln>
+                  <a:noFill/>
+                </a:ln>
+                <a:solidFill>
+                  <a:schemeClr val="bg1"/>
+                </a:solidFill>
+                <a:effectLst/>
+                <a:uLnTx/>
+                <a:uFillTx/>
+                <a:latin typeface="+mj-lt"/>
+                <a:ea typeface="+mj-ea"/>
+                <a:cs typeface="+mj-cs"/>
+              </a:rPr>
+              <a:t>Fitur-fitur</a:t>
+            </a:r>
+            <a:r>
+              <a:rPr kumimoji="0" lang="en-US" sz="4400" b="0" i="0" u="none" strike="noStrike" kern="1200" cap="none" spc="0" normalizeH="0" baseline="0" noProof="0" dirty="0" smtClean="0">
+                <a:ln>
+                  <a:noFill/>
+                </a:ln>
+                <a:solidFill>
+                  <a:schemeClr val="bg1"/>
+                </a:solidFill>
+                <a:effectLst/>
+                <a:uLnTx/>
+                <a:uFillTx/>
+                <a:latin typeface="+mj-lt"/>
+                <a:ea typeface="+mj-ea"/>
+                <a:cs typeface="+mj-cs"/>
+              </a:rPr>
+              <a:t> yang </a:t>
+            </a:r>
+            <a:r>
+              <a:rPr kumimoji="0" lang="en-US" sz="4400" b="0" i="0" u="none" strike="noStrike" kern="1200" cap="none" spc="0" normalizeH="0" baseline="0" noProof="0" dirty="0" err="1" smtClean="0">
+                <a:ln>
+                  <a:noFill/>
+                </a:ln>
+                <a:solidFill>
+                  <a:schemeClr val="bg1"/>
+                </a:solidFill>
+                <a:effectLst/>
+                <a:uLnTx/>
+                <a:uFillTx/>
+                <a:latin typeface="+mj-lt"/>
+                <a:ea typeface="+mj-ea"/>
+                <a:cs typeface="+mj-cs"/>
+              </a:rPr>
+              <a:t>terdapat</a:t>
+            </a:r>
+            <a:r>
+              <a:rPr kumimoji="0" lang="en-US" sz="4400" b="0" i="0" u="none" strike="noStrike" kern="1200" cap="none" spc="0" normalizeH="0" baseline="0" noProof="0" dirty="0" smtClean="0">
+                <a:ln>
+                  <a:noFill/>
+                </a:ln>
+                <a:solidFill>
+                  <a:schemeClr val="bg1"/>
+                </a:solidFill>
+                <a:effectLst/>
+                <a:uLnTx/>
+                <a:uFillTx/>
+                <a:latin typeface="+mj-lt"/>
+                <a:ea typeface="+mj-ea"/>
+                <a:cs typeface="+mj-cs"/>
+              </a:rPr>
+              <a:t> </a:t>
+            </a:r>
+            <a:r>
+              <a:rPr kumimoji="0" lang="en-US" sz="4400" b="0" i="0" u="none" strike="noStrike" kern="1200" cap="none" spc="0" normalizeH="0" baseline="0" noProof="0" dirty="0" err="1" smtClean="0">
+                <a:ln>
+                  <a:noFill/>
+                </a:ln>
+                <a:solidFill>
+                  <a:schemeClr val="bg1"/>
+                </a:solidFill>
+                <a:effectLst/>
+                <a:uLnTx/>
+                <a:uFillTx/>
+                <a:latin typeface="+mj-lt"/>
+                <a:ea typeface="+mj-ea"/>
+                <a:cs typeface="+mj-cs"/>
+              </a:rPr>
+              <a:t>pada</a:t>
+            </a:r>
+            <a:r>
+              <a:rPr kumimoji="0" lang="en-US" sz="4400" b="0" i="0" u="none" strike="noStrike" kern="1200" cap="none" spc="0" normalizeH="0" baseline="0" noProof="0" dirty="0" smtClean="0">
+                <a:ln>
+                  <a:noFill/>
+                </a:ln>
+                <a:solidFill>
+                  <a:schemeClr val="bg1"/>
+                </a:solidFill>
+                <a:effectLst/>
+                <a:uLnTx/>
+                <a:uFillTx/>
+                <a:latin typeface="+mj-lt"/>
+                <a:ea typeface="+mj-ea"/>
+                <a:cs typeface="+mj-cs"/>
+              </a:rPr>
+              <a:t> Batman’s Challenge</a:t>
+            </a:r>
+            <a:r>
+              <a:rPr lang="en-US" sz="4400" dirty="0" smtClean="0">
+                <a:solidFill>
+                  <a:schemeClr val="bg1"/>
+                </a:solidFill>
+              </a:rPr>
+              <a:t>(Cont..)</a:t>
+            </a:r>
+            <a:endParaRPr kumimoji="0" lang="en-US" sz="4400" b="0" i="0" u="none" strike="noStrike" kern="1200" cap="none" spc="0" normalizeH="0" baseline="0" noProof="0" dirty="0">
+              <a:ln>
+                <a:noFill/>
+              </a:ln>
+              <a:solidFill>
+                <a:schemeClr val="bg1"/>
+              </a:solidFill>
+              <a:effectLst/>
+              <a:uLnTx/>
+              <a:uFillTx/>
+              <a:latin typeface="+mj-lt"/>
+              <a:ea typeface="+mj-ea"/>
+              <a:cs typeface="+mj-cs"/>
+            </a:endParaRPr>
+          </a:p>
+        </p:txBody>
+      </p:sp>
+      <p:sp>
+        <p:nvSpPr>
+          <p:cNvPr id="11" name="Rounded Rectangle 10"/>
+          <p:cNvSpPr/>
+          <p:nvPr/>
+        </p:nvSpPr>
+        <p:spPr>
+          <a:xfrm>
+            <a:off x="762000" y="3733800"/>
+            <a:ext cx="2133600" cy="533400"/>
+          </a:xfrm>
+          <a:prstGeom prst="roundRect">
+            <a:avLst/>
+          </a:prstGeom>
+          <a:solidFill>
+            <a:schemeClr val="tx1"/>
+          </a:solidFill>
+        </p:spPr>
+        <p:style>
+          <a:lnRef idx="2">
+            <a:schemeClr val="accent1">
+              <a:shade val="50000"/>
+            </a:schemeClr>
+          </a:lnRef>
+          <a:fillRef idx="1">
+            <a:schemeClr val="accent1"/>
+          </a:fillRef>
+          <a:effectRef idx="0">
+            <a:schemeClr val="accent1"/>
+          </a:effectRef>
+          <a:fontRef idx="minor">
+            <a:schemeClr val="lt1"/>
+          </a:fontRef>
+        </p:style>
+        <p:txBody>
+          <a:bodyPr rtlCol="0" anchor="ctr"/>
+          <a:lstStyle/>
+          <a:p>
+            <a:pPr algn="ctr"/>
+            <a:r>
+              <a:rPr lang="en-US" b="1" dirty="0" smtClean="0"/>
+              <a:t>NEXT LEVEL &amp; WIN</a:t>
+            </a:r>
+            <a:endParaRPr lang="en-US" b="1" dirty="0"/>
+          </a:p>
+        </p:txBody>
+      </p:sp>
+      <p:pic>
+        <p:nvPicPr>
+          <p:cNvPr id="12" name="Content Placeholder 11" descr="Fitur next level.jpg"/>
+          <p:cNvPicPr>
+            <a:picLocks noGrp="1" noChangeAspect="1"/>
+          </p:cNvPicPr>
+          <p:nvPr>
+            <p:ph sz="half" idx="1"/>
+          </p:nvPr>
+        </p:nvPicPr>
+        <p:blipFill>
+          <a:blip r:embed="rId3"/>
+          <a:stretch>
+            <a:fillRect/>
+          </a:stretch>
+        </p:blipFill>
+        <p:spPr>
+          <a:xfrm>
+            <a:off x="4953000" y="1676400"/>
+            <a:ext cx="3733800" cy="2383587"/>
+          </a:xfrm>
+        </p:spPr>
+      </p:pic>
+      <p:pic>
+        <p:nvPicPr>
+          <p:cNvPr id="13" name="Picture 12" descr="Fitur Win.jpg"/>
+          <p:cNvPicPr>
+            <a:picLocks noChangeAspect="1"/>
+          </p:cNvPicPr>
+          <p:nvPr/>
+        </p:nvPicPr>
+        <p:blipFill>
+          <a:blip r:embed="rId4"/>
+          <a:stretch>
+            <a:fillRect/>
+          </a:stretch>
+        </p:blipFill>
+        <p:spPr>
+          <a:xfrm>
+            <a:off x="4953000" y="4267200"/>
+            <a:ext cx="3805237" cy="2416102"/>
+          </a:xfrm>
+          <a:prstGeom prst="rect">
+            <a:avLst/>
+          </a:prstGeom>
+        </p:spPr>
+      </p:pic>
+    </p:spTree>
+  </p:cSld>
+  <p:clrMapOvr>
+    <a:masterClrMapping/>
+  </p:clrMapOvr>
+  <p:timing>
+    <p:tnLst>
+      <p:par>
+        <p:cTn id="1" dur="indefinite" restart="never" nodeType="tmRoot"/>
+      </p:par>
+    </p:tnLst>
+  </p:timing>
+</p:sld>
+</file>
+
+<file path=ppt/slides/slide8.xml><?xml version="1.0" encoding="utf-8"?>
+<p:sld xmlns:a="http://schemas.openxmlformats.org/drawingml/2006/main" xmlns:r="http://schemas.openxmlformats.org/officeDocument/2006/relationships" xmlns:p="http://schemas.openxmlformats.org/presentationml/2006/main">
+  <p:cSld>
+    <p:spTree>
+      <p:nvGrpSpPr>
+        <p:cNvPr id="1" name=""/>
+        <p:cNvGrpSpPr/>
+        <p:nvPr/>
+      </p:nvGrpSpPr>
+      <p:grpSpPr>
+        <a:xfrm>
+          <a:off x="0" y="0"/>
+          <a:ext cx="0" cy="0"/>
+          <a:chOff x="0" y="0"/>
+          <a:chExt cx="0" cy="0"/>
+        </a:xfrm>
+      </p:grpSpPr>
+      <p:pic>
+        <p:nvPicPr>
+          <p:cNvPr id="4" name="Content Placeholder 3" descr="uml 20 november.jpg"/>
+          <p:cNvPicPr>
+            <a:picLocks noGrp="1" noChangeAspect="1"/>
+          </p:cNvPicPr>
+          <p:nvPr>
+            <p:ph idx="1"/>
+          </p:nvPr>
+        </p:nvPicPr>
+        <p:blipFill>
+          <a:blip r:embed="rId2"/>
+          <a:stretch>
+            <a:fillRect/>
+          </a:stretch>
+        </p:blipFill>
+        <p:spPr>
+          <a:xfrm>
+            <a:off x="0" y="-1"/>
+            <a:ext cx="9144000" cy="7303111"/>
+          </a:xfrm>
+        </p:spPr>
+      </p:pic>
+    </p:spTree>
+  </p:cSld>
+  <p:clrMapOvr>
+    <a:masterClrMapping/>
+  </p:clrMapOvr>
+  <p:timing>
+    <p:tnLst>
+      <p:par>
+        <p:cTn id="1" dur="indefinite" restart="never" nodeType="tmRoot"/>
+      </p:par>
+    </p:tnLst>
+  </p:timing>
+</p:sld>
+</file>
+
+<file path=ppt/slides/slide9.xml><?xml version="1.0" encoding="utf-8"?>
+<p:sld xmlns:a="http://schemas.openxmlformats.org/drawingml/2006/main" xmlns:r="http://schemas.openxmlformats.org/officeDocument/2006/relationships" xmlns:p="http://schemas.openxmlformats.org/presentationml/2006/main">
+  <p:cSld>
+    <p:spTree>
+      <p:nvGrpSpPr>
+        <p:cNvPr id="1" name=""/>
+        <p:cNvGrpSpPr/>
+        <p:nvPr/>
+      </p:nvGrpSpPr>
+      <p:grpSpPr>
+        <a:xfrm>
+          <a:off x="0" y="0"/>
+          <a:ext cx="0" cy="0"/>
+          <a:chOff x="0" y="0"/>
+          <a:chExt cx="0" cy="0"/>
+        </a:xfrm>
+      </p:grpSpPr>
+      <p:pic>
+        <p:nvPicPr>
+          <p:cNvPr id="4098" name="Picture 2" descr="D:\TA ADBO CHIP\Chips-challenge\Chip\Image\batmanasylum.png"/>
+          <p:cNvPicPr>
+            <a:picLocks noChangeAspect="1" noChangeArrowheads="1"/>
+          </p:cNvPicPr>
+          <p:nvPr/>
+        </p:nvPicPr>
+        <p:blipFill>
+          <a:blip r:embed="rId2"/>
+          <a:srcRect/>
+          <a:stretch>
+            <a:fillRect/>
+          </a:stretch>
+        </p:blipFill>
+        <p:spPr bwMode="auto">
+          <a:xfrm>
+            <a:off x="2743200" y="1000206"/>
+            <a:ext cx="3962400" cy="5857794"/>
+          </a:xfrm>
+          <a:prstGeom prst="rect">
+            <a:avLst/>
+          </a:prstGeom>
+          <a:noFill/>
+        </p:spPr>
+      </p:pic>
+      <p:sp>
+        <p:nvSpPr>
+          <p:cNvPr id="2" name="Title 1"/>
+          <p:cNvSpPr>
+            <a:spLocks noGrp="1"/>
+          </p:cNvSpPr>
+          <p:nvPr>
+            <p:ph type="title"/>
+          </p:nvPr>
+        </p:nvSpPr>
+        <p:spPr/>
+        <p:txBody>
+          <a:bodyPr/>
+          <a:lstStyle/>
+          <a:p>
+            <a:r>
+              <a:rPr lang="en-US" b="1" dirty="0" smtClean="0"/>
+              <a:t>DEMO</a:t>
+            </a:r>
+            <a:endParaRPr lang="en-US" b="1" dirty="0"/>
           </a:p>
         </p:txBody>
       </p:sp>
@@ -4224,24 +6766,6 @@
               <a:buNone/>
             </a:pPr>
             <a:endParaRPr lang="en-US" dirty="0"/>
-          </a:p>
-          <a:p>
-            <a:pPr algn="ctr">
-              <a:buNone/>
-            </a:pPr>
-            <a:r>
-              <a:rPr lang="en-US" u="sng" dirty="0" smtClean="0">
-                <a:solidFill>
-                  <a:srgbClr val="0070C0"/>
-                </a:solidFill>
-              </a:rPr>
-              <a:t>Batman’s Challenge</a:t>
-            </a:r>
-            <a:endParaRPr lang="en-US" u="sng" dirty="0">
-              <a:solidFill>
-                <a:srgbClr val="0070C0"/>
-              </a:solidFill>
-            </a:endParaRPr>
           </a:p>
         </p:txBody>
       </p:sp>

</xml_diff>